<commit_message>
Added M. Gitzendanner story content to notebooks.
</commit_message>
<xml_diff>
--- a/presentations/02.2_activation_functions.pptx
+++ b/presentations/02.2_activation_functions.pptx
@@ -5,22 +5,23 @@
     <p:sldMasterId id="2147483648" r:id="rId1"/>
   </p:sldMasterIdLst>
   <p:notesMasterIdLst>
-    <p:notesMasterId r:id="rId15"/>
+    <p:notesMasterId r:id="rId16"/>
   </p:notesMasterIdLst>
   <p:sldIdLst>
     <p:sldId id="322" r:id="rId2"/>
     <p:sldId id="298" r:id="rId3"/>
-    <p:sldId id="307" r:id="rId4"/>
-    <p:sldId id="324" r:id="rId5"/>
-    <p:sldId id="325" r:id="rId6"/>
-    <p:sldId id="326" r:id="rId7"/>
-    <p:sldId id="300" r:id="rId8"/>
-    <p:sldId id="327" r:id="rId9"/>
-    <p:sldId id="323" r:id="rId10"/>
-    <p:sldId id="305" r:id="rId11"/>
-    <p:sldId id="328" r:id="rId12"/>
-    <p:sldId id="309" r:id="rId13"/>
-    <p:sldId id="269" r:id="rId14"/>
+    <p:sldId id="330" r:id="rId4"/>
+    <p:sldId id="307" r:id="rId5"/>
+    <p:sldId id="324" r:id="rId6"/>
+    <p:sldId id="325" r:id="rId7"/>
+    <p:sldId id="326" r:id="rId8"/>
+    <p:sldId id="300" r:id="rId9"/>
+    <p:sldId id="327" r:id="rId10"/>
+    <p:sldId id="323" r:id="rId11"/>
+    <p:sldId id="329" r:id="rId12"/>
+    <p:sldId id="305" r:id="rId13"/>
+    <p:sldId id="328" r:id="rId14"/>
+    <p:sldId id="309" r:id="rId15"/>
   </p:sldIdLst>
   <p:sldSz cx="12192000" cy="6858000"/>
   <p:notesSz cx="6858000" cy="9144000"/>
@@ -220,7 +221,7 @@
           <a:p>
             <a:fld id="{FD93C9B2-20F6-4DB1-B471-224337D0AC79}" type="datetimeFigureOut">
               <a:rPr lang="en-US" smtClean="0"/>
-              <a:t>6/24/2022</a:t>
+              <a:t>10/10/2022</a:t>
             </a:fld>
             <a:endParaRPr lang="en-US"/>
           </a:p>
@@ -622,7 +623,104 @@
           <a:bodyPr/>
           <a:lstStyle/>
           <a:p>
-            <a:endParaRPr lang="en-US" dirty="0"/>
+            <a:pPr marL="0" marR="0" lvl="0" indent="0" algn="l" defTabSz="914400" rtl="0" eaLnBrk="1" fontAlgn="auto" latinLnBrk="0" hangingPunct="1">
+              <a:lnSpc>
+                <a:spcPct val="100000"/>
+              </a:lnSpc>
+              <a:spcBef>
+                <a:spcPts val="0"/>
+              </a:spcBef>
+              <a:spcAft>
+                <a:spcPts val="0"/>
+              </a:spcAft>
+              <a:buClrTx/>
+              <a:buSzTx/>
+              <a:buFontTx/>
+              <a:buNone/>
+              <a:tabLst/>
+              <a:defRPr/>
+            </a:pPr>
+            <a:r>
+              <a:rPr lang="en-US" sz="1200" dirty="0">
+                <a:solidFill>
+                  <a:schemeClr val="tx1">
+                    <a:lumMod val="65000"/>
+                    <a:lumOff val="35000"/>
+                  </a:schemeClr>
+                </a:solidFill>
+                <a:latin typeface="+mj-lt"/>
+                <a:ea typeface="Verdana" panose="020B0604030504040204" pitchFamily="34" charset="0"/>
+              </a:rPr>
+              <a:t>Tensorflow Playground: </a:t>
+            </a:r>
+            <a:r>
+              <a:rPr lang="en-US" sz="1200" dirty="0">
+                <a:solidFill>
+                  <a:schemeClr val="tx1">
+                    <a:lumMod val="65000"/>
+                    <a:lumOff val="35000"/>
+                  </a:schemeClr>
+                </a:solidFill>
+                <a:latin typeface="Palatino Linotype" panose="02040502050505030304" pitchFamily="18" charset="0"/>
+              </a:rPr>
+              <a:t>https://playground.tensorflow.org/</a:t>
+            </a:r>
+          </a:p>
+          <a:p>
+            <a:pPr marL="0" marR="0" lvl="0" indent="0" algn="l" defTabSz="914400" rtl="0" eaLnBrk="1" fontAlgn="auto" latinLnBrk="0" hangingPunct="1">
+              <a:lnSpc>
+                <a:spcPct val="100000"/>
+              </a:lnSpc>
+              <a:spcBef>
+                <a:spcPts val="0"/>
+              </a:spcBef>
+              <a:spcAft>
+                <a:spcPts val="0"/>
+              </a:spcAft>
+              <a:buClrTx/>
+              <a:buSzTx/>
+              <a:buFontTx/>
+              <a:buNone/>
+              <a:tabLst/>
+              <a:defRPr/>
+            </a:pPr>
+            <a:endParaRPr lang="en-US" sz="1200" dirty="0">
+              <a:solidFill>
+                <a:schemeClr val="tx1">
+                  <a:lumMod val="65000"/>
+                  <a:lumOff val="35000"/>
+                </a:schemeClr>
+              </a:solidFill>
+              <a:latin typeface="Palatino Linotype" panose="02040502050505030304" pitchFamily="18" charset="0"/>
+            </a:endParaRPr>
+          </a:p>
+          <a:p>
+            <a:pPr marL="0" marR="0" lvl="0" indent="0" algn="l" defTabSz="914400" rtl="0" eaLnBrk="1" fontAlgn="auto" latinLnBrk="0" hangingPunct="1">
+              <a:lnSpc>
+                <a:spcPct val="100000"/>
+              </a:lnSpc>
+              <a:spcBef>
+                <a:spcPts val="0"/>
+              </a:spcBef>
+              <a:spcAft>
+                <a:spcPts val="0"/>
+              </a:spcAft>
+              <a:buClrTx/>
+              <a:buSzTx/>
+              <a:buFontTx/>
+              <a:buNone/>
+              <a:tabLst/>
+              <a:defRPr/>
+            </a:pPr>
+            <a:endParaRPr lang="en-US" sz="1200" dirty="0">
+              <a:solidFill>
+                <a:schemeClr val="tx1">
+                  <a:lumMod val="65000"/>
+                  <a:lumOff val="35000"/>
+                </a:schemeClr>
+              </a:solidFill>
+              <a:latin typeface="Palatino Linotype" panose="02040502050505030304" pitchFamily="18" charset="0"/>
+            </a:endParaRPr>
           </a:p>
         </p:txBody>
       </p:sp>
@@ -652,7 +750,7 @@
     </p:spTree>
     <p:extLst>
       <p:ext uri="{BB962C8B-B14F-4D97-AF65-F5344CB8AC3E}">
-        <p14:creationId xmlns:p14="http://schemas.microsoft.com/office/powerpoint/2010/main" val="1974960137"/>
+        <p14:creationId xmlns:p14="http://schemas.microsoft.com/office/powerpoint/2010/main" val="1404376956"/>
       </p:ext>
     </p:extLst>
   </p:cSld>
@@ -723,15 +821,46 @@
               <a:tabLst/>
               <a:defRPr/>
             </a:pPr>
-            <a:endParaRPr lang="en-US" sz="1200" dirty="0">
-              <a:solidFill>
-                <a:schemeClr val="tx1">
-                  <a:lumMod val="65000"/>
-                  <a:lumOff val="35000"/>
-                </a:schemeClr>
-              </a:solidFill>
-              <a:latin typeface="Palatino Linotype" panose="02040502050505030304" pitchFamily="18" charset="0"/>
-            </a:endParaRPr>
+            <a:r>
+              <a:rPr lang="en-US" sz="1200" dirty="0">
+                <a:solidFill>
+                  <a:schemeClr val="tx1">
+                    <a:lumMod val="65000"/>
+                    <a:lumOff val="35000"/>
+                  </a:schemeClr>
+                </a:solidFill>
+                <a:latin typeface="+mj-lt"/>
+                <a:ea typeface="Verdana" panose="020B0604030504040204" pitchFamily="34" charset="0"/>
+              </a:rPr>
+              <a:t>Source: Google Teachable Machine: </a:t>
+            </a:r>
+            <a:r>
+              <a:rPr lang="en-US" sz="1200" dirty="0">
+                <a:solidFill>
+                  <a:schemeClr val="tx1">
+                    <a:lumMod val="65000"/>
+                    <a:lumOff val="35000"/>
+                  </a:schemeClr>
+                </a:solidFill>
+                <a:latin typeface="+mj-lt"/>
+                <a:ea typeface="Verdana" panose="020B0604030504040204" pitchFamily="34" charset="0"/>
+                <a:hlinkClick r:id="rId3"/>
+              </a:rPr>
+              <a:t>https://teachablemachine.withgoogle.com</a:t>
+            </a:r>
+            <a:r>
+              <a:rPr lang="en-US" sz="1200" dirty="0">
+                <a:solidFill>
+                  <a:schemeClr val="tx1">
+                    <a:lumMod val="65000"/>
+                    <a:lumOff val="35000"/>
+                  </a:schemeClr>
+                </a:solidFill>
+                <a:latin typeface="+mj-lt"/>
+                <a:ea typeface="Verdana" panose="020B0604030504040204" pitchFamily="34" charset="0"/>
+              </a:rPr>
+              <a:t> </a:t>
+            </a:r>
           </a:p>
           <a:p>
             <a:pPr marL="0" marR="0" lvl="0" indent="0" algn="l" defTabSz="914400" rtl="0" eaLnBrk="1" fontAlgn="auto" latinLnBrk="0" hangingPunct="1">
@@ -761,6 +890,174 @@
               <a:latin typeface="Palatino Linotype" panose="02040502050505030304" pitchFamily="18" charset="0"/>
             </a:endParaRPr>
           </a:p>
+          <a:p>
+            <a:pPr marL="0" marR="0" lvl="0" indent="0" algn="l" defTabSz="914400" rtl="0" eaLnBrk="1" fontAlgn="auto" latinLnBrk="0" hangingPunct="1">
+              <a:lnSpc>
+                <a:spcPct val="100000"/>
+              </a:lnSpc>
+              <a:spcBef>
+                <a:spcPts val="0"/>
+              </a:spcBef>
+              <a:spcAft>
+                <a:spcPts val="0"/>
+              </a:spcAft>
+              <a:buClrTx/>
+              <a:buSzTx/>
+              <a:buFontTx/>
+              <a:buNone/>
+              <a:tabLst/>
+              <a:defRPr/>
+            </a:pPr>
+            <a:r>
+              <a:rPr lang="en-US" sz="1200" dirty="0">
+                <a:solidFill>
+                  <a:schemeClr val="tx1">
+                    <a:lumMod val="65000"/>
+                    <a:lumOff val="35000"/>
+                  </a:schemeClr>
+                </a:solidFill>
+                <a:latin typeface="Palatino Linotype" panose="02040502050505030304" pitchFamily="18" charset="0"/>
+              </a:rPr>
+              <a:t>Two Locations for the Hanfu/Hanbok dataset</a:t>
+            </a:r>
+          </a:p>
+          <a:p>
+            <a:pPr marL="0" marR="0" lvl="0" indent="0" algn="l" defTabSz="914400" rtl="0" eaLnBrk="1" fontAlgn="auto" latinLnBrk="0" hangingPunct="1">
+              <a:lnSpc>
+                <a:spcPct val="100000"/>
+              </a:lnSpc>
+              <a:spcBef>
+                <a:spcPts val="0"/>
+              </a:spcBef>
+              <a:spcAft>
+                <a:spcPts val="0"/>
+              </a:spcAft>
+              <a:buClrTx/>
+              <a:buSzTx/>
+              <a:buFontTx/>
+              <a:buNone/>
+              <a:tabLst/>
+              <a:defRPr/>
+            </a:pPr>
+            <a:r>
+              <a:rPr lang="en-US" b="0" i="0" dirty="0">
+                <a:effectLst/>
+                <a:latin typeface="Lato" panose="020F0502020204030203" pitchFamily="34" charset="0"/>
+              </a:rPr>
+              <a:t>	https://drive.google.com/file/d/1q3RIgIoeePNW-fEgNyCgh45gBvMAdeOU/view</a:t>
+            </a:r>
+          </a:p>
+          <a:p>
+            <a:pPr marL="0" marR="0" lvl="0" indent="0" algn="l" defTabSz="914400" rtl="0" eaLnBrk="1" fontAlgn="auto" latinLnBrk="0" hangingPunct="1">
+              <a:lnSpc>
+                <a:spcPct val="100000"/>
+              </a:lnSpc>
+              <a:spcBef>
+                <a:spcPts val="0"/>
+              </a:spcBef>
+              <a:spcAft>
+                <a:spcPts val="0"/>
+              </a:spcAft>
+              <a:buClrTx/>
+              <a:buSzTx/>
+              <a:buFontTx/>
+              <a:buNone/>
+              <a:tabLst/>
+              <a:defRPr/>
+            </a:pPr>
+            <a:r>
+              <a:rPr lang="en-US" b="0" i="0" dirty="0">
+                <a:effectLst/>
+                <a:latin typeface="Lato" panose="020F0502020204030203" pitchFamily="34" charset="0"/>
+              </a:rPr>
+              <a:t>	https://drive.google.com/file/d/1WbZPzunh6u9f0leymbzmVrJjSxq6JW5w/view?usp=sharing</a:t>
+            </a:r>
+          </a:p>
+          <a:p>
+            <a:pPr marL="0" marR="0" lvl="0" indent="0" algn="l" defTabSz="914400" rtl="0" eaLnBrk="1" fontAlgn="auto" latinLnBrk="0" hangingPunct="1">
+              <a:lnSpc>
+                <a:spcPct val="100000"/>
+              </a:lnSpc>
+              <a:spcBef>
+                <a:spcPts val="0"/>
+              </a:spcBef>
+              <a:spcAft>
+                <a:spcPts val="0"/>
+              </a:spcAft>
+              <a:buClrTx/>
+              <a:buSzTx/>
+              <a:buFontTx/>
+              <a:buNone/>
+              <a:tabLst/>
+              <a:defRPr/>
+            </a:pPr>
+            <a:endParaRPr lang="en-US" sz="1200" dirty="0">
+              <a:solidFill>
+                <a:schemeClr val="tx1">
+                  <a:lumMod val="65000"/>
+                  <a:lumOff val="35000"/>
+                </a:schemeClr>
+              </a:solidFill>
+              <a:latin typeface="+mj-lt"/>
+              <a:ea typeface="Verdana" panose="020B0604030504040204" pitchFamily="34" charset="0"/>
+            </a:endParaRPr>
+          </a:p>
+          <a:p>
+            <a:pPr marL="0" marR="0" lvl="0" indent="0" algn="l" defTabSz="914400" rtl="0" eaLnBrk="1" fontAlgn="auto" latinLnBrk="0" hangingPunct="1">
+              <a:lnSpc>
+                <a:spcPct val="100000"/>
+              </a:lnSpc>
+              <a:spcBef>
+                <a:spcPts val="0"/>
+              </a:spcBef>
+              <a:spcAft>
+                <a:spcPts val="0"/>
+              </a:spcAft>
+              <a:buClrTx/>
+              <a:buSzTx/>
+              <a:buFontTx/>
+              <a:buNone/>
+              <a:tabLst/>
+              <a:defRPr/>
+            </a:pPr>
+            <a:endParaRPr lang="en-US" sz="1200" dirty="0">
+              <a:solidFill>
+                <a:schemeClr val="tx1">
+                  <a:lumMod val="65000"/>
+                  <a:lumOff val="35000"/>
+                </a:schemeClr>
+              </a:solidFill>
+              <a:latin typeface="Palatino Linotype" panose="02040502050505030304" pitchFamily="18" charset="0"/>
+            </a:endParaRPr>
+          </a:p>
+          <a:p>
+            <a:pPr marL="0" marR="0" lvl="0" indent="0" algn="l" defTabSz="914400" rtl="0" eaLnBrk="1" fontAlgn="auto" latinLnBrk="0" hangingPunct="1">
+              <a:lnSpc>
+                <a:spcPct val="100000"/>
+              </a:lnSpc>
+              <a:spcBef>
+                <a:spcPts val="0"/>
+              </a:spcBef>
+              <a:spcAft>
+                <a:spcPts val="0"/>
+              </a:spcAft>
+              <a:buClrTx/>
+              <a:buSzTx/>
+              <a:buFontTx/>
+              <a:buNone/>
+              <a:tabLst/>
+              <a:defRPr/>
+            </a:pPr>
+            <a:endParaRPr lang="en-US" sz="1200" dirty="0">
+              <a:solidFill>
+                <a:schemeClr val="tx1">
+                  <a:lumMod val="65000"/>
+                  <a:lumOff val="35000"/>
+                </a:schemeClr>
+              </a:solidFill>
+              <a:latin typeface="Palatino Linotype" panose="02040502050505030304" pitchFamily="18" charset="0"/>
+            </a:endParaRPr>
+          </a:p>
         </p:txBody>
       </p:sp>
       <p:sp>
@@ -789,7 +1086,7 @@
     </p:spTree>
     <p:extLst>
       <p:ext uri="{BB962C8B-B14F-4D97-AF65-F5344CB8AC3E}">
-        <p14:creationId xmlns:p14="http://schemas.microsoft.com/office/powerpoint/2010/main" val="3984198268"/>
+        <p14:creationId xmlns:p14="http://schemas.microsoft.com/office/powerpoint/2010/main" val="418680798"/>
       </p:ext>
     </p:extLst>
   </p:cSld>
@@ -843,29 +1140,6 @@
           <a:bodyPr/>
           <a:lstStyle/>
           <a:p>
-            <a:pPr marL="0" marR="0" lvl="0" indent="0" algn="l" defTabSz="914400" rtl="0" eaLnBrk="1" fontAlgn="auto" latinLnBrk="0" hangingPunct="1">
-              <a:lnSpc>
-                <a:spcPct val="100000"/>
-              </a:lnSpc>
-              <a:spcBef>
-                <a:spcPts val="0"/>
-              </a:spcBef>
-              <a:spcAft>
-                <a:spcPts val="0"/>
-              </a:spcAft>
-              <a:buClrTx/>
-              <a:buSzTx/>
-              <a:buFontTx/>
-              <a:buNone/>
-              <a:tabLst/>
-              <a:defRPr/>
-            </a:pPr>
-            <a:r>
-              <a:rPr lang="en-US" dirty="0"/>
-              <a:t>The learning experience for this workshop starts on page 55 of the textbook.  For additional information, please watch the exercise 2.01 orientation video.</a:t>
-            </a:r>
-          </a:p>
-          <a:p>
             <a:endParaRPr lang="en-US" dirty="0"/>
           </a:p>
         </p:txBody>
@@ -896,7 +1170,7 @@
     </p:spTree>
     <p:extLst>
       <p:ext uri="{BB962C8B-B14F-4D97-AF65-F5344CB8AC3E}">
-        <p14:creationId xmlns:p14="http://schemas.microsoft.com/office/powerpoint/2010/main" val="1401395996"/>
+        <p14:creationId xmlns:p14="http://schemas.microsoft.com/office/powerpoint/2010/main" val="1974960137"/>
       </p:ext>
     </p:extLst>
   </p:cSld>
@@ -950,42 +1224,60 @@
           <a:bodyPr/>
           <a:lstStyle/>
           <a:p>
-            <a:r>
-              <a:rPr lang="en-US" sz="1200" b="0" i="0" kern="1200" dirty="0">
-                <a:solidFill>
-                  <a:schemeClr val="tx1"/>
-                </a:solidFill>
-                <a:effectLst/>
-                <a:latin typeface="+mn-lt"/>
-                <a:ea typeface="+mn-ea"/>
-                <a:cs typeface="+mn-cs"/>
-              </a:rPr>
-              <a:t>As you continue your deep learning </a:t>
-            </a:r>
-            <a:r>
-              <a:rPr lang="en-US" sz="1200" b="0" i="0" kern="1200">
-                <a:solidFill>
-                  <a:schemeClr val="tx1"/>
-                </a:solidFill>
-                <a:effectLst/>
-                <a:latin typeface="+mn-lt"/>
-                <a:ea typeface="+mn-ea"/>
-                <a:cs typeface="+mn-cs"/>
-              </a:rPr>
-              <a:t>journey, you </a:t>
-            </a:r>
-            <a:r>
-              <a:rPr lang="en-US" sz="1200" b="0" i="0" kern="1200" dirty="0">
-                <a:solidFill>
-                  <a:schemeClr val="tx1"/>
-                </a:solidFill>
-                <a:effectLst/>
-                <a:latin typeface="+mn-lt"/>
-                <a:ea typeface="+mn-ea"/>
-                <a:cs typeface="+mn-cs"/>
-              </a:rPr>
-              <a:t>will encounter a variety of mathematical equations and symbols.  But do not fear!  With a little effort, you will quickly master them.  To get you started, here’s a list of the most frequently used mathematical symbols in deep learning, along with their definitions.  </a:t>
-            </a:r>
+            <a:pPr marL="0" marR="0" lvl="0" indent="0" algn="l" defTabSz="914400" rtl="0" eaLnBrk="1" fontAlgn="auto" latinLnBrk="0" hangingPunct="1">
+              <a:lnSpc>
+                <a:spcPct val="100000"/>
+              </a:lnSpc>
+              <a:spcBef>
+                <a:spcPts val="0"/>
+              </a:spcBef>
+              <a:spcAft>
+                <a:spcPts val="0"/>
+              </a:spcAft>
+              <a:buClrTx/>
+              <a:buSzTx/>
+              <a:buFontTx/>
+              <a:buNone/>
+              <a:tabLst/>
+              <a:defRPr/>
+            </a:pPr>
+            <a:endParaRPr lang="en-US" sz="1200" dirty="0">
+              <a:solidFill>
+                <a:schemeClr val="tx1">
+                  <a:lumMod val="65000"/>
+                  <a:lumOff val="35000"/>
+                </a:schemeClr>
+              </a:solidFill>
+              <a:latin typeface="Palatino Linotype" panose="02040502050505030304" pitchFamily="18" charset="0"/>
+            </a:endParaRPr>
+          </a:p>
+          <a:p>
+            <a:pPr marL="0" marR="0" lvl="0" indent="0" algn="l" defTabSz="914400" rtl="0" eaLnBrk="1" fontAlgn="auto" latinLnBrk="0" hangingPunct="1">
+              <a:lnSpc>
+                <a:spcPct val="100000"/>
+              </a:lnSpc>
+              <a:spcBef>
+                <a:spcPts val="0"/>
+              </a:spcBef>
+              <a:spcAft>
+                <a:spcPts val="0"/>
+              </a:spcAft>
+              <a:buClrTx/>
+              <a:buSzTx/>
+              <a:buFontTx/>
+              <a:buNone/>
+              <a:tabLst/>
+              <a:defRPr/>
+            </a:pPr>
+            <a:endParaRPr lang="en-US" sz="1200" dirty="0">
+              <a:solidFill>
+                <a:schemeClr val="tx1">
+                  <a:lumMod val="65000"/>
+                  <a:lumOff val="35000"/>
+                </a:schemeClr>
+              </a:solidFill>
+              <a:latin typeface="Palatino Linotype" panose="02040502050505030304" pitchFamily="18" charset="0"/>
+            </a:endParaRPr>
           </a:p>
         </p:txBody>
       </p:sp>
@@ -1015,7 +1307,114 @@
     </p:spTree>
     <p:extLst>
       <p:ext uri="{BB962C8B-B14F-4D97-AF65-F5344CB8AC3E}">
-        <p14:creationId xmlns:p14="http://schemas.microsoft.com/office/powerpoint/2010/main" val="2550897438"/>
+        <p14:creationId xmlns:p14="http://schemas.microsoft.com/office/powerpoint/2010/main" val="3984198268"/>
+      </p:ext>
+    </p:extLst>
+  </p:cSld>
+  <p:clrMapOvr>
+    <a:masterClrMapping/>
+  </p:clrMapOvr>
+</p:notes>
+</file>
+
+<file path=ppt/notesSlides/notesSlide14.xml><?xml version="1.0" encoding="utf-8"?>
+<p:notes xmlns:a="http://schemas.openxmlformats.org/drawingml/2006/main" xmlns:r="http://schemas.openxmlformats.org/officeDocument/2006/relationships" xmlns:p="http://schemas.openxmlformats.org/presentationml/2006/main">
+  <p:cSld>
+    <p:spTree>
+      <p:nvGrpSpPr>
+        <p:cNvPr id="1" name=""/>
+        <p:cNvGrpSpPr/>
+        <p:nvPr/>
+      </p:nvGrpSpPr>
+      <p:grpSpPr>
+        <a:xfrm>
+          <a:off x="0" y="0"/>
+          <a:ext cx="0" cy="0"/>
+          <a:chOff x="0" y="0"/>
+          <a:chExt cx="0" cy="0"/>
+        </a:xfrm>
+      </p:grpSpPr>
+      <p:sp>
+        <p:nvSpPr>
+          <p:cNvPr id="2" name="Slide Image Placeholder 1"/>
+          <p:cNvSpPr>
+            <a:spLocks noGrp="1" noRot="1" noChangeAspect="1"/>
+          </p:cNvSpPr>
+          <p:nvPr>
+            <p:ph type="sldImg"/>
+          </p:nvPr>
+        </p:nvSpPr>
+        <p:spPr/>
+      </p:sp>
+      <p:sp>
+        <p:nvSpPr>
+          <p:cNvPr id="3" name="Notes Placeholder 2"/>
+          <p:cNvSpPr>
+            <a:spLocks noGrp="1"/>
+          </p:cNvSpPr>
+          <p:nvPr>
+            <p:ph type="body" idx="1"/>
+          </p:nvPr>
+        </p:nvSpPr>
+        <p:spPr/>
+        <p:txBody>
+          <a:bodyPr/>
+          <a:lstStyle/>
+          <a:p>
+            <a:pPr marL="0" marR="0" lvl="0" indent="0" algn="l" defTabSz="914400" rtl="0" eaLnBrk="1" fontAlgn="auto" latinLnBrk="0" hangingPunct="1">
+              <a:lnSpc>
+                <a:spcPct val="100000"/>
+              </a:lnSpc>
+              <a:spcBef>
+                <a:spcPts val="0"/>
+              </a:spcBef>
+              <a:spcAft>
+                <a:spcPts val="0"/>
+              </a:spcAft>
+              <a:buClrTx/>
+              <a:buSzTx/>
+              <a:buFontTx/>
+              <a:buNone/>
+              <a:tabLst/>
+              <a:defRPr/>
+            </a:pPr>
+            <a:r>
+              <a:rPr lang="en-US" dirty="0"/>
+              <a:t>The learning experience for this workshop starts on page 55 of the textbook.  For additional information, please watch the exercise 2.01 orientation video.</a:t>
+            </a:r>
+          </a:p>
+          <a:p>
+            <a:endParaRPr lang="en-US" dirty="0"/>
+          </a:p>
+        </p:txBody>
+      </p:sp>
+      <p:sp>
+        <p:nvSpPr>
+          <p:cNvPr id="4" name="Slide Number Placeholder 3"/>
+          <p:cNvSpPr>
+            <a:spLocks noGrp="1"/>
+          </p:cNvSpPr>
+          <p:nvPr>
+            <p:ph type="sldNum" sz="quarter" idx="5"/>
+          </p:nvPr>
+        </p:nvSpPr>
+        <p:spPr/>
+        <p:txBody>
+          <a:bodyPr/>
+          <a:lstStyle/>
+          <a:p>
+            <a:fld id="{3148858F-F1DB-4027-9C85-CCA6849540DD}" type="slidenum">
+              <a:rPr lang="en-US" smtClean="0"/>
+              <a:t>14</a:t>
+            </a:fld>
+            <a:endParaRPr lang="en-US"/>
+          </a:p>
+        </p:txBody>
+      </p:sp>
+    </p:spTree>
+    <p:extLst>
+      <p:ext uri="{BB962C8B-B14F-4D97-AF65-F5344CB8AC3E}">
+        <p14:creationId xmlns:p14="http://schemas.microsoft.com/office/powerpoint/2010/main" val="1401395996"/>
       </p:ext>
     </p:extLst>
   </p:cSld>
@@ -1297,111 +1696,17 @@
           <a:lstStyle/>
           <a:p>
             <a:r>
-              <a:rPr lang="en-US" b="0" i="0" dirty="0">
-                <a:solidFill>
-                  <a:srgbClr val="3D3B49"/>
-                </a:solidFill>
-                <a:effectLst/>
-                <a:latin typeface="+mn-lt"/>
-              </a:rPr>
-              <a:t>Let’s first consider activation functions comprised of one or more straight lines, also known as </a:t>
-            </a:r>
-            <a:r>
-              <a:rPr lang="en-US" b="1" i="0" dirty="0">
-                <a:solidFill>
-                  <a:srgbClr val="3D3B49"/>
-                </a:solidFill>
-                <a:effectLst/>
-                <a:latin typeface="+mn-lt"/>
-              </a:rPr>
-              <a:t>linear</a:t>
-            </a:r>
-            <a:r>
-              <a:rPr lang="en-US" b="0" i="0" dirty="0">
-                <a:solidFill>
-                  <a:srgbClr val="3D3B49"/>
-                </a:solidFill>
-                <a:effectLst/>
-                <a:latin typeface="+mn-lt"/>
-              </a:rPr>
-              <a:t> functions.  </a:t>
-            </a:r>
-          </a:p>
-          <a:p>
-            <a:endParaRPr lang="en-US" b="0" i="0" dirty="0">
-              <a:solidFill>
-                <a:srgbClr val="3D3B49"/>
-              </a:solidFill>
-              <a:effectLst/>
-              <a:latin typeface="+mn-lt"/>
-            </a:endParaRPr>
-          </a:p>
-          <a:p>
-            <a:pPr marL="228600" indent="-228600">
-              <a:buAutoNum type="arabicPeriod"/>
-            </a:pPr>
-            <a:r>
-              <a:rPr lang="en-US" b="0" i="0" dirty="0">
-                <a:solidFill>
-                  <a:srgbClr val="3D3B49"/>
-                </a:solidFill>
-                <a:effectLst/>
-                <a:latin typeface="+mn-lt"/>
-              </a:rPr>
-              <a:t>Now in Python, a </a:t>
-            </a:r>
-            <a:r>
-              <a:rPr lang="en-US" b="0" i="0" dirty="0">
-                <a:solidFill>
-                  <a:srgbClr val="000000"/>
-                </a:solidFill>
-                <a:effectLst/>
-                <a:latin typeface="Verdana" panose="020B0604030504040204" pitchFamily="34" charset="0"/>
-              </a:rPr>
-              <a:t>function is a named block of code that only runs when it is called.  Most functions allow you to pass data – called parameters – into them.  Most functions also return a value once they’ve been executed.  Here we see a simple function called f, with one parameter called x.  When we pass a value on the x-axis to this function, it returns a value that is then assigned to a variable named y.</a:t>
-            </a:r>
-          </a:p>
-          <a:p>
-            <a:pPr marL="0" indent="0">
-              <a:buNone/>
-            </a:pPr>
-            <a:endParaRPr lang="en-US" b="0" i="0" dirty="0">
-              <a:solidFill>
-                <a:srgbClr val="000000"/>
-              </a:solidFill>
-              <a:effectLst/>
-              <a:latin typeface="Verdana" panose="020B0604030504040204" pitchFamily="34" charset="0"/>
-            </a:endParaRPr>
-          </a:p>
-          <a:p>
-            <a:r>
-              <a:rPr lang="en-US" b="0" i="0" dirty="0">
-                <a:solidFill>
-                  <a:srgbClr val="000000"/>
-                </a:solidFill>
-                <a:effectLst/>
-                <a:latin typeface="Verdana" panose="020B0604030504040204" pitchFamily="34" charset="0"/>
-              </a:rPr>
-              <a:t>Pictured here are graphs for three different linear functions.  In the case of the graph on the left, i</a:t>
-            </a:r>
-            <a:r>
-              <a:rPr lang="en-US" dirty="0">
-                <a:latin typeface="+mn-lt"/>
-              </a:rPr>
-              <a:t>f we pick any point on the X axis, and go vertically up until we hit the line, the value of that intersection on the Y axis is the same as the value on the X axis.  That is, the output, or y value, of this curve is always the same as the input, or x value. We call this the identity function.</a:t>
-            </a:r>
-          </a:p>
-          <a:p>
-            <a:endParaRPr lang="en-US" dirty="0">
-              <a:latin typeface="+mn-lt"/>
-            </a:endParaRPr>
-          </a:p>
-          <a:p>
-            <a:r>
-              <a:rPr lang="en-US" dirty="0">
-                <a:latin typeface="+mn-lt"/>
-              </a:rPr>
-              <a:t>With the other two graphs, the lines are tilted, reflecting different slopes.  This is typically what we see in simple linear regression.</a:t>
+              <a:rPr lang="en-US" dirty="0"/>
+              <a:t>Rosenblatt’s original perceptron was a simple animal.  When z was any value less than or equal to zero, the perceptron output 0.  If z became positive to even the tiniest extent, the perceptron outputs 1.  But this sudden and extreme transition is not optimal during training.  Essentially, the neuron has no finesse – it’s either yelling or its silent. </a:t>
+            </a:r>
+          </a:p>
+          <a:p>
+            <a:endParaRPr lang="en-US" dirty="0"/>
+          </a:p>
+          <a:p>
+            <a:r>
+              <a:rPr lang="en-US" dirty="0"/>
+              <a:t>Think about it like this.  In real life, learning is generally incremental, consisting of a series of small steps towards mastery.  It’s rarely the case that complete understanding occurs in an instant, at a moment in time.  The same holds true in deep learning.  Ideally, we’d like to move along a gradient, capable of reflecting small learning adjustments.</a:t>
             </a:r>
           </a:p>
         </p:txBody>
@@ -1432,7 +1737,7 @@
     </p:spTree>
     <p:extLst>
       <p:ext uri="{BB962C8B-B14F-4D97-AF65-F5344CB8AC3E}">
-        <p14:creationId xmlns:p14="http://schemas.microsoft.com/office/powerpoint/2010/main" val="2435178342"/>
+        <p14:creationId xmlns:p14="http://schemas.microsoft.com/office/powerpoint/2010/main" val="1201252548"/>
       </p:ext>
     </p:extLst>
   </p:cSld>
@@ -1487,17 +1792,111 @@
           <a:lstStyle/>
           <a:p>
             <a:r>
-              <a:rPr lang="en-US" dirty="0"/>
-              <a:t>The ReLU, or rectified linear unit outputs 0 for all negative inputs, otherwise the output is the input.</a:t>
-            </a:r>
-          </a:p>
-          <a:p>
-            <a:endParaRPr lang="en-US" dirty="0"/>
-          </a:p>
-          <a:p>
-            <a:r>
-              <a:rPr lang="en-US" dirty="0"/>
-              <a:t>The ReLU activation function is popular because it’s simple and trains well.</a:t>
+              <a:rPr lang="en-US" b="0" i="0" dirty="0">
+                <a:solidFill>
+                  <a:srgbClr val="3D3B49"/>
+                </a:solidFill>
+                <a:effectLst/>
+                <a:latin typeface="+mn-lt"/>
+              </a:rPr>
+              <a:t>Let’s first consider activation functions comprised of one or more straight lines, also known as </a:t>
+            </a:r>
+            <a:r>
+              <a:rPr lang="en-US" b="1" i="0" dirty="0">
+                <a:solidFill>
+                  <a:srgbClr val="3D3B49"/>
+                </a:solidFill>
+                <a:effectLst/>
+                <a:latin typeface="+mn-lt"/>
+              </a:rPr>
+              <a:t>linear</a:t>
+            </a:r>
+            <a:r>
+              <a:rPr lang="en-US" b="0" i="0" dirty="0">
+                <a:solidFill>
+                  <a:srgbClr val="3D3B49"/>
+                </a:solidFill>
+                <a:effectLst/>
+                <a:latin typeface="+mn-lt"/>
+              </a:rPr>
+              <a:t> functions.  </a:t>
+            </a:r>
+          </a:p>
+          <a:p>
+            <a:endParaRPr lang="en-US" b="0" i="0" dirty="0">
+              <a:solidFill>
+                <a:srgbClr val="3D3B49"/>
+              </a:solidFill>
+              <a:effectLst/>
+              <a:latin typeface="+mn-lt"/>
+            </a:endParaRPr>
+          </a:p>
+          <a:p>
+            <a:pPr marL="228600" indent="-228600">
+              <a:buAutoNum type="arabicPeriod"/>
+            </a:pPr>
+            <a:r>
+              <a:rPr lang="en-US" b="0" i="0" dirty="0">
+                <a:solidFill>
+                  <a:srgbClr val="3D3B49"/>
+                </a:solidFill>
+                <a:effectLst/>
+                <a:latin typeface="+mn-lt"/>
+              </a:rPr>
+              <a:t>Now in Python, a </a:t>
+            </a:r>
+            <a:r>
+              <a:rPr lang="en-US" b="0" i="0" dirty="0">
+                <a:solidFill>
+                  <a:srgbClr val="000000"/>
+                </a:solidFill>
+                <a:effectLst/>
+                <a:latin typeface="Verdana" panose="020B0604030504040204" pitchFamily="34" charset="0"/>
+              </a:rPr>
+              <a:t>function is a named block of code that only runs when it is called.  Most functions allow you to pass data – called parameters – into them.  Most functions also return a value once they’ve been executed.  Here we see a simple function called f, with one parameter called x.  When we pass a value on the x-axis to this function, it returns a value that is then assigned to a variable named y.</a:t>
+            </a:r>
+          </a:p>
+          <a:p>
+            <a:pPr marL="0" indent="0">
+              <a:buNone/>
+            </a:pPr>
+            <a:endParaRPr lang="en-US" b="0" i="0" dirty="0">
+              <a:solidFill>
+                <a:srgbClr val="000000"/>
+              </a:solidFill>
+              <a:effectLst/>
+              <a:latin typeface="Verdana" panose="020B0604030504040204" pitchFamily="34" charset="0"/>
+            </a:endParaRPr>
+          </a:p>
+          <a:p>
+            <a:r>
+              <a:rPr lang="en-US" b="0" i="0" dirty="0">
+                <a:solidFill>
+                  <a:srgbClr val="000000"/>
+                </a:solidFill>
+                <a:effectLst/>
+                <a:latin typeface="Verdana" panose="020B0604030504040204" pitchFamily="34" charset="0"/>
+              </a:rPr>
+              <a:t>Pictured here are graphs for three different linear functions.  In the case of the graph on the left, i</a:t>
+            </a:r>
+            <a:r>
+              <a:rPr lang="en-US" dirty="0">
+                <a:latin typeface="+mn-lt"/>
+              </a:rPr>
+              <a:t>f we pick any point on the X axis, and go vertically up until we hit the line, the value of that intersection on the Y axis is the same as the value on the X axis.  That is, the output, or y value, of this curve is always the same as the input, or x value. We call this the identity function.</a:t>
+            </a:r>
+          </a:p>
+          <a:p>
+            <a:endParaRPr lang="en-US" dirty="0">
+              <a:latin typeface="+mn-lt"/>
+            </a:endParaRPr>
+          </a:p>
+          <a:p>
+            <a:r>
+              <a:rPr lang="en-US" dirty="0">
+                <a:latin typeface="+mn-lt"/>
+              </a:rPr>
+              <a:t>With the other two graphs, the lines are tilted, reflecting different slopes.  This is typically what we see in simple linear regression.</a:t>
             </a:r>
           </a:p>
         </p:txBody>
@@ -1528,7 +1927,7 @@
     </p:spTree>
     <p:extLst>
       <p:ext uri="{BB962C8B-B14F-4D97-AF65-F5344CB8AC3E}">
-        <p14:creationId xmlns:p14="http://schemas.microsoft.com/office/powerpoint/2010/main" val="2719074499"/>
+        <p14:creationId xmlns:p14="http://schemas.microsoft.com/office/powerpoint/2010/main" val="2435178342"/>
       </p:ext>
     </p:extLst>
   </p:cSld>
@@ -1583,18 +1982,18 @@
           <a:lstStyle/>
           <a:p>
             <a:r>
-              <a:rPr lang="en-US" b="0" i="0" dirty="0">
-                <a:solidFill>
-                  <a:srgbClr val="3D3B49"/>
-                </a:solidFill>
-                <a:effectLst/>
-                <a:latin typeface="+mn-lt"/>
-              </a:rPr>
-              <a:t>The S-shaped sigmoid function is also called the logistic function or logistic curve. It has a value of 0 for very negative inputs, and a value of 1 for very positive inputs. In this example, we see a smooth transition between 0 and 1 for x values ranging from -6 to 6.  The name sigmoid comes from the resemblance of the curve to an S shape,</a:t>
-            </a:r>
-            <a:endParaRPr lang="en-US" i="0" dirty="0">
-              <a:latin typeface="+mn-lt"/>
-            </a:endParaRPr>
+              <a:rPr lang="en-US" dirty="0"/>
+              <a:t>The ReLU, or rectified linear unit outputs 0 for all negative inputs, otherwise the output is the input.</a:t>
+            </a:r>
+          </a:p>
+          <a:p>
+            <a:endParaRPr lang="en-US" dirty="0"/>
+          </a:p>
+          <a:p>
+            <a:r>
+              <a:rPr lang="en-US" dirty="0"/>
+              <a:t>The ReLU activation function is popular because it’s simple and trains well.</a:t>
+            </a:r>
           </a:p>
         </p:txBody>
       </p:sp>
@@ -1624,7 +2023,7 @@
     </p:spTree>
     <p:extLst>
       <p:ext uri="{BB962C8B-B14F-4D97-AF65-F5344CB8AC3E}">
-        <p14:creationId xmlns:p14="http://schemas.microsoft.com/office/powerpoint/2010/main" val="1463262732"/>
+        <p14:creationId xmlns:p14="http://schemas.microsoft.com/office/powerpoint/2010/main" val="2719074499"/>
       </p:ext>
     </p:extLst>
   </p:cSld>
@@ -1686,7 +2085,7 @@
                 <a:effectLst/>
                 <a:latin typeface="+mn-lt"/>
               </a:rPr>
-              <a:t>The hyperbolic tangent function, written tanh, is S-shaped like the sigmoid.  The key differences are that it returns a value of −1 for very negative inputs, and the transition zone is a bit narrower.</a:t>
+              <a:t>The S-shaped sigmoid function is also called the logistic function or logistic curve. It has a value of 0 for very negative inputs, and a value of 1 for very positive inputs. In this example, we see a smooth transition between 0 and 1 for x values ranging from -6 to 6.  The name sigmoid comes from the resemblance of the curve to an S shape,</a:t>
             </a:r>
             <a:endParaRPr lang="en-US" i="0" dirty="0">
               <a:latin typeface="+mn-lt"/>
@@ -1720,7 +2119,7 @@
     </p:spTree>
     <p:extLst>
       <p:ext uri="{BB962C8B-B14F-4D97-AF65-F5344CB8AC3E}">
-        <p14:creationId xmlns:p14="http://schemas.microsoft.com/office/powerpoint/2010/main" val="3290497714"/>
+        <p14:creationId xmlns:p14="http://schemas.microsoft.com/office/powerpoint/2010/main" val="1463262732"/>
       </p:ext>
     </p:extLst>
   </p:cSld>
@@ -1774,19 +2173,18 @@
           <a:bodyPr/>
           <a:lstStyle/>
           <a:p>
-            <a:pPr algn="l"/>
-            <a:r>
-              <a:rPr lang="en-US" dirty="0"/>
-              <a:t>Before moving on, let’s visualize the Linear, ReLu, and Sigmoid activation functions in three-dimensional space.  We’ve already seen the graphs for these functions, so the first line is no surprise.  On the second, however, we see their three-dimensional equivalents.  Linear is just a plane, like a sheet of paper. ReLU is like a wedge.  And Sigmoid is like a surf wave.  </a:t>
-            </a:r>
-            <a:endParaRPr lang="en-US" sz="1200" b="0" i="0" kern="1200" dirty="0">
-              <a:solidFill>
-                <a:schemeClr val="tx1"/>
-              </a:solidFill>
-              <a:effectLst/>
+            <a:r>
+              <a:rPr lang="en-US" b="0" i="0" dirty="0">
+                <a:solidFill>
+                  <a:srgbClr val="3D3B49"/>
+                </a:solidFill>
+                <a:effectLst/>
+                <a:latin typeface="+mn-lt"/>
+              </a:rPr>
+              <a:t>The hyperbolic tangent function, written tanh, is S-shaped like the sigmoid.  The key differences are that it returns a value of −1 for very negative inputs, and the transition zone is a bit narrower.</a:t>
+            </a:r>
+            <a:endParaRPr lang="en-US" i="0" dirty="0">
               <a:latin typeface="+mn-lt"/>
-              <a:ea typeface="+mn-ea"/>
-              <a:cs typeface="+mn-cs"/>
             </a:endParaRPr>
           </a:p>
         </p:txBody>
@@ -1817,7 +2215,7 @@
     </p:spTree>
     <p:extLst>
       <p:ext uri="{BB962C8B-B14F-4D97-AF65-F5344CB8AC3E}">
-        <p14:creationId xmlns:p14="http://schemas.microsoft.com/office/powerpoint/2010/main" val="1743978050"/>
+        <p14:creationId xmlns:p14="http://schemas.microsoft.com/office/powerpoint/2010/main" val="3290497714"/>
       </p:ext>
     </p:extLst>
   </p:cSld>
@@ -1871,28 +2269,20 @@
           <a:bodyPr/>
           <a:lstStyle/>
           <a:p>
-            <a:r>
-              <a:rPr lang="en-US" i="0" dirty="0"/>
-              <a:t>There’s an operation that we typically apply only to the output neurons of a classifier neural network, and even then, only if there are two or more output neurons. </a:t>
-            </a:r>
-          </a:p>
-          <a:p>
-            <a:endParaRPr lang="en-US" i="0" dirty="0"/>
-          </a:p>
-          <a:p>
-            <a:r>
-              <a:rPr lang="en-US" i="0" dirty="0"/>
-              <a:t>It’s not an activation function in the sense that we’ve been using the term because it takes as input the outputs of all the output neurons simultaneously. It processes them together and then produces a new output value for each neuron. Though it’s not quite an activation function, it’s similar enough to include it in this discussion.</a:t>
-            </a:r>
-          </a:p>
-          <a:p>
-            <a:endParaRPr lang="en-US" i="0" dirty="0"/>
-          </a:p>
-          <a:p>
-            <a:r>
-              <a:rPr lang="en-US" i="0" dirty="0"/>
-              <a:t>The technique is called softmax. The purpose of softmax is to turn the numbers that come out of a classification network into class probabilities where all the probabilities add up to 1.</a:t>
-            </a:r>
+            <a:pPr algn="l"/>
+            <a:r>
+              <a:rPr lang="en-US" dirty="0"/>
+              <a:t>Before moving on, let’s visualize the Linear, ReLu, and Sigmoid activation functions in three-dimensional space.  We’ve already seen the graphs for these functions, so the first line is no surprise.  On the second, however, we see their three-dimensional equivalents.  Linear is just a plane, like a sheet of paper. ReLU is like a wedge.  And Sigmoid is like a surf wave.  </a:t>
+            </a:r>
+            <a:endParaRPr lang="en-US" sz="1200" b="0" i="0" kern="1200" dirty="0">
+              <a:solidFill>
+                <a:schemeClr val="tx1"/>
+              </a:solidFill>
+              <a:effectLst/>
+              <a:latin typeface="+mn-lt"/>
+              <a:ea typeface="+mn-ea"/>
+              <a:cs typeface="+mn-cs"/>
+            </a:endParaRPr>
           </a:p>
         </p:txBody>
       </p:sp>
@@ -1922,7 +2312,7 @@
     </p:spTree>
     <p:extLst>
       <p:ext uri="{BB962C8B-B14F-4D97-AF65-F5344CB8AC3E}">
-        <p14:creationId xmlns:p14="http://schemas.microsoft.com/office/powerpoint/2010/main" val="2163631354"/>
+        <p14:creationId xmlns:p14="http://schemas.microsoft.com/office/powerpoint/2010/main" val="1743978050"/>
       </p:ext>
     </p:extLst>
   </p:cSld>
@@ -1976,209 +2366,28 @@
           <a:bodyPr/>
           <a:lstStyle/>
           <a:p>
-            <a:pPr marL="0" marR="0" lvl="0" indent="0" algn="l" defTabSz="914400" rtl="0" eaLnBrk="1" fontAlgn="auto" latinLnBrk="0" hangingPunct="1">
-              <a:lnSpc>
-                <a:spcPct val="100000"/>
-              </a:lnSpc>
-              <a:spcBef>
-                <a:spcPts val="0"/>
-              </a:spcBef>
-              <a:spcAft>
-                <a:spcPts val="0"/>
-              </a:spcAft>
-              <a:buClrTx/>
-              <a:buSzTx/>
-              <a:buFontTx/>
-              <a:buNone/>
-              <a:tabLst/>
-              <a:defRPr/>
-            </a:pPr>
-            <a:r>
-              <a:rPr lang="en-US" sz="1200" dirty="0">
-                <a:solidFill>
-                  <a:schemeClr val="tx1">
-                    <a:lumMod val="65000"/>
-                    <a:lumOff val="35000"/>
-                  </a:schemeClr>
-                </a:solidFill>
-                <a:latin typeface="+mj-lt"/>
-                <a:ea typeface="Verdana" panose="020B0604030504040204" pitchFamily="34" charset="0"/>
-              </a:rPr>
-              <a:t>Link: </a:t>
-            </a:r>
-            <a:r>
-              <a:rPr lang="en-US" sz="1200" dirty="0">
-                <a:solidFill>
-                  <a:schemeClr val="tx1">
-                    <a:lumMod val="65000"/>
-                    <a:lumOff val="35000"/>
-                  </a:schemeClr>
-                </a:solidFill>
-                <a:latin typeface="+mj-lt"/>
-                <a:ea typeface="Verdana" panose="020B0604030504040204" pitchFamily="34" charset="0"/>
-                <a:hlinkClick r:id="rId3"/>
-              </a:rPr>
-              <a:t>https://teachablemachine.withgoogle.com</a:t>
-            </a:r>
-            <a:r>
-              <a:rPr lang="en-US" sz="1200" dirty="0">
-                <a:solidFill>
-                  <a:schemeClr val="tx1">
-                    <a:lumMod val="65000"/>
-                    <a:lumOff val="35000"/>
-                  </a:schemeClr>
-                </a:solidFill>
-                <a:latin typeface="+mj-lt"/>
-                <a:ea typeface="Verdana" panose="020B0604030504040204" pitchFamily="34" charset="0"/>
-              </a:rPr>
-              <a:t> </a:t>
-            </a:r>
-          </a:p>
-          <a:p>
-            <a:pPr marL="0" marR="0" lvl="0" indent="0" algn="l" defTabSz="914400" rtl="0" eaLnBrk="1" fontAlgn="auto" latinLnBrk="0" hangingPunct="1">
-              <a:lnSpc>
-                <a:spcPct val="100000"/>
-              </a:lnSpc>
-              <a:spcBef>
-                <a:spcPts val="0"/>
-              </a:spcBef>
-              <a:spcAft>
-                <a:spcPts val="0"/>
-              </a:spcAft>
-              <a:buClrTx/>
-              <a:buSzTx/>
-              <a:buFontTx/>
-              <a:buNone/>
-              <a:tabLst/>
-              <a:defRPr/>
-            </a:pPr>
-            <a:r>
-              <a:rPr lang="en-US" sz="1200" dirty="0">
-                <a:solidFill>
-                  <a:schemeClr val="tx1">
-                    <a:lumMod val="65000"/>
-                    <a:lumOff val="35000"/>
-                  </a:schemeClr>
-                </a:solidFill>
-                <a:latin typeface="+mj-lt"/>
-                <a:ea typeface="Verdana" panose="020B0604030504040204" pitchFamily="34" charset="0"/>
-              </a:rPr>
-              <a:t>Link: https://developers.google.com/machine-learning/glossary#e</a:t>
-            </a:r>
-          </a:p>
-          <a:p>
-            <a:pPr marL="0" marR="0" lvl="0" indent="0" algn="l" defTabSz="914400" rtl="0" eaLnBrk="1" fontAlgn="auto" latinLnBrk="0" hangingPunct="1">
-              <a:lnSpc>
-                <a:spcPct val="100000"/>
-              </a:lnSpc>
-              <a:spcBef>
-                <a:spcPts val="0"/>
-              </a:spcBef>
-              <a:spcAft>
-                <a:spcPts val="0"/>
-              </a:spcAft>
-              <a:buClrTx/>
-              <a:buSzTx/>
-              <a:buFontTx/>
-              <a:buNone/>
-              <a:tabLst/>
-              <a:defRPr/>
-            </a:pPr>
-            <a:endParaRPr lang="en-US" sz="1200" dirty="0">
-              <a:solidFill>
-                <a:schemeClr val="tx1">
-                  <a:lumMod val="65000"/>
-                  <a:lumOff val="35000"/>
-                </a:schemeClr>
-              </a:solidFill>
-              <a:latin typeface="+mj-lt"/>
-              <a:ea typeface="Verdana" panose="020B0604030504040204" pitchFamily="34" charset="0"/>
-            </a:endParaRPr>
-          </a:p>
-          <a:p>
-            <a:pPr marL="0" marR="0" lvl="0" indent="0" algn="l" defTabSz="914400" rtl="0" eaLnBrk="1" fontAlgn="auto" latinLnBrk="0" hangingPunct="1">
-              <a:lnSpc>
-                <a:spcPct val="100000"/>
-              </a:lnSpc>
-              <a:spcBef>
-                <a:spcPts val="0"/>
-              </a:spcBef>
-              <a:spcAft>
-                <a:spcPts val="0"/>
-              </a:spcAft>
-              <a:buClrTx/>
-              <a:buSzTx/>
-              <a:buFontTx/>
-              <a:buNone/>
-              <a:tabLst/>
-              <a:defRPr/>
-            </a:pPr>
-            <a:endParaRPr lang="en-US" sz="1200" dirty="0">
-              <a:solidFill>
-                <a:schemeClr val="tx1">
-                  <a:lumMod val="65000"/>
-                  <a:lumOff val="35000"/>
-                </a:schemeClr>
-              </a:solidFill>
-              <a:latin typeface="+mj-lt"/>
-              <a:ea typeface="Verdana" panose="020B0604030504040204" pitchFamily="34" charset="0"/>
-            </a:endParaRPr>
-          </a:p>
-          <a:p>
-            <a:pPr marL="0" marR="0" lvl="0" indent="0" algn="l" defTabSz="914400" rtl="0" eaLnBrk="1" fontAlgn="auto" latinLnBrk="0" hangingPunct="1">
-              <a:lnSpc>
-                <a:spcPct val="100000"/>
-              </a:lnSpc>
-              <a:spcBef>
-                <a:spcPts val="0"/>
-              </a:spcBef>
-              <a:spcAft>
-                <a:spcPts val="0"/>
-              </a:spcAft>
-              <a:buClrTx/>
-              <a:buSzTx/>
-              <a:buFontTx/>
-              <a:buNone/>
-              <a:tabLst/>
-              <a:defRPr/>
-            </a:pPr>
-            <a:endParaRPr lang="en-US" sz="1200" dirty="0">
-              <a:solidFill>
-                <a:schemeClr val="tx1">
-                  <a:lumMod val="65000"/>
-                  <a:lumOff val="35000"/>
-                </a:schemeClr>
-              </a:solidFill>
-              <a:latin typeface="Palatino Linotype" panose="02040502050505030304" pitchFamily="18" charset="0"/>
-            </a:endParaRPr>
-          </a:p>
-          <a:p>
-            <a:pPr marL="0" marR="0" lvl="0" indent="0" algn="l" defTabSz="914400" rtl="0" eaLnBrk="1" fontAlgn="auto" latinLnBrk="0" hangingPunct="1">
-              <a:lnSpc>
-                <a:spcPct val="100000"/>
-              </a:lnSpc>
-              <a:spcBef>
-                <a:spcPts val="0"/>
-              </a:spcBef>
-              <a:spcAft>
-                <a:spcPts val="0"/>
-              </a:spcAft>
-              <a:buClrTx/>
-              <a:buSzTx/>
-              <a:buFontTx/>
-              <a:buNone/>
-              <a:tabLst/>
-              <a:defRPr/>
-            </a:pPr>
-            <a:endParaRPr lang="en-US" sz="1200" dirty="0">
-              <a:solidFill>
-                <a:schemeClr val="tx1">
-                  <a:lumMod val="65000"/>
-                  <a:lumOff val="35000"/>
-                </a:schemeClr>
-              </a:solidFill>
-              <a:latin typeface="Palatino Linotype" panose="02040502050505030304" pitchFamily="18" charset="0"/>
-            </a:endParaRPr>
+            <a:r>
+              <a:rPr lang="en-US" i="0" dirty="0"/>
+              <a:t>There’s an operation that we typically apply only to the output neurons of a classifier neural network, and even then, only if there are two or more output neurons. </a:t>
+            </a:r>
+          </a:p>
+          <a:p>
+            <a:endParaRPr lang="en-US" i="0" dirty="0"/>
+          </a:p>
+          <a:p>
+            <a:r>
+              <a:rPr lang="en-US" i="0" dirty="0"/>
+              <a:t>It’s not an activation function in the sense that we’ve been using the term because it takes as input the outputs of all the output neurons simultaneously. It processes them together and then produces a new output value for each neuron. Though it’s not quite an activation function, it’s similar enough to include it in this discussion.</a:t>
+            </a:r>
+          </a:p>
+          <a:p>
+            <a:endParaRPr lang="en-US" i="0" dirty="0"/>
+          </a:p>
+          <a:p>
+            <a:r>
+              <a:rPr lang="en-US" i="0" dirty="0"/>
+              <a:t>The technique is called softmax. The purpose of softmax is to turn the numbers that come out of a classification network into class probabilities where all the probabilities add up to 1.</a:t>
+            </a:r>
           </a:p>
         </p:txBody>
       </p:sp>
@@ -2208,7 +2417,7 @@
     </p:spTree>
     <p:extLst>
       <p:ext uri="{BB962C8B-B14F-4D97-AF65-F5344CB8AC3E}">
-        <p14:creationId xmlns:p14="http://schemas.microsoft.com/office/powerpoint/2010/main" val="1404376956"/>
+        <p14:creationId xmlns:p14="http://schemas.microsoft.com/office/powerpoint/2010/main" val="2163631354"/>
       </p:ext>
     </p:extLst>
   </p:cSld>
@@ -2365,7 +2574,7 @@
           <a:p>
             <a:fld id="{C3F78080-8D0A-4BE8-A5B4-CB115102D524}" type="datetimeFigureOut">
               <a:rPr lang="en-US" smtClean="0"/>
-              <a:t>6/24/2022</a:t>
+              <a:t>10/10/2022</a:t>
             </a:fld>
             <a:endParaRPr lang="en-US"/>
           </a:p>
@@ -2563,7 +2772,7 @@
           <a:p>
             <a:fld id="{C3F78080-8D0A-4BE8-A5B4-CB115102D524}" type="datetimeFigureOut">
               <a:rPr lang="en-US" smtClean="0"/>
-              <a:t>6/24/2022</a:t>
+              <a:t>10/10/2022</a:t>
             </a:fld>
             <a:endParaRPr lang="en-US"/>
           </a:p>
@@ -2771,7 +2980,7 @@
           <a:p>
             <a:fld id="{C3F78080-8D0A-4BE8-A5B4-CB115102D524}" type="datetimeFigureOut">
               <a:rPr lang="en-US" smtClean="0"/>
-              <a:t>6/24/2022</a:t>
+              <a:t>10/10/2022</a:t>
             </a:fld>
             <a:endParaRPr lang="en-US"/>
           </a:p>
@@ -2969,7 +3178,7 @@
           <a:p>
             <a:fld id="{C3F78080-8D0A-4BE8-A5B4-CB115102D524}" type="datetimeFigureOut">
               <a:rPr lang="en-US" smtClean="0"/>
-              <a:t>6/24/2022</a:t>
+              <a:t>10/10/2022</a:t>
             </a:fld>
             <a:endParaRPr lang="en-US"/>
           </a:p>
@@ -3244,7 +3453,7 @@
           <a:p>
             <a:fld id="{C3F78080-8D0A-4BE8-A5B4-CB115102D524}" type="datetimeFigureOut">
               <a:rPr lang="en-US" smtClean="0"/>
-              <a:t>6/24/2022</a:t>
+              <a:t>10/10/2022</a:t>
             </a:fld>
             <a:endParaRPr lang="en-US"/>
           </a:p>
@@ -3509,7 +3718,7 @@
           <a:p>
             <a:fld id="{C3F78080-8D0A-4BE8-A5B4-CB115102D524}" type="datetimeFigureOut">
               <a:rPr lang="en-US" smtClean="0"/>
-              <a:t>6/24/2022</a:t>
+              <a:t>10/10/2022</a:t>
             </a:fld>
             <a:endParaRPr lang="en-US"/>
           </a:p>
@@ -3921,7 +4130,7 @@
           <a:p>
             <a:fld id="{C3F78080-8D0A-4BE8-A5B4-CB115102D524}" type="datetimeFigureOut">
               <a:rPr lang="en-US" smtClean="0"/>
-              <a:t>6/24/2022</a:t>
+              <a:t>10/10/2022</a:t>
             </a:fld>
             <a:endParaRPr lang="en-US"/>
           </a:p>
@@ -4062,7 +4271,7 @@
           <a:p>
             <a:fld id="{C3F78080-8D0A-4BE8-A5B4-CB115102D524}" type="datetimeFigureOut">
               <a:rPr lang="en-US" smtClean="0"/>
-              <a:t>6/24/2022</a:t>
+              <a:t>10/10/2022</a:t>
             </a:fld>
             <a:endParaRPr lang="en-US"/>
           </a:p>
@@ -4175,7 +4384,7 @@
           <a:p>
             <a:fld id="{C3F78080-8D0A-4BE8-A5B4-CB115102D524}" type="datetimeFigureOut">
               <a:rPr lang="en-US" smtClean="0"/>
-              <a:t>6/24/2022</a:t>
+              <a:t>10/10/2022</a:t>
             </a:fld>
             <a:endParaRPr lang="en-US"/>
           </a:p>
@@ -4486,7 +4695,7 @@
           <a:p>
             <a:fld id="{C3F78080-8D0A-4BE8-A5B4-CB115102D524}" type="datetimeFigureOut">
               <a:rPr lang="en-US" smtClean="0"/>
-              <a:t>6/24/2022</a:t>
+              <a:t>10/10/2022</a:t>
             </a:fld>
             <a:endParaRPr lang="en-US"/>
           </a:p>
@@ -4774,7 +4983,7 @@
           <a:p>
             <a:fld id="{C3F78080-8D0A-4BE8-A5B4-CB115102D524}" type="datetimeFigureOut">
               <a:rPr lang="en-US" smtClean="0"/>
-              <a:t>6/24/2022</a:t>
+              <a:t>10/10/2022</a:t>
             </a:fld>
             <a:endParaRPr lang="en-US"/>
           </a:p>
@@ -5015,7 +5224,7 @@
           <a:p>
             <a:fld id="{C3F78080-8D0A-4BE8-A5B4-CB115102D524}" type="datetimeFigureOut">
               <a:rPr lang="en-US" smtClean="0"/>
-              <a:t>6/24/2022</a:t>
+              <a:t>10/10/2022</a:t>
             </a:fld>
             <a:endParaRPr lang="en-US"/>
           </a:p>
@@ -5546,6 +5755,244 @@
           <a:chExt cx="0" cy="0"/>
         </a:xfrm>
       </p:grpSpPr>
+      <p:pic>
+        <p:nvPicPr>
+          <p:cNvPr id="4" name="Picture 3">
+            <a:extLst>
+              <a:ext uri="{FF2B5EF4-FFF2-40B4-BE49-F238E27FC236}">
+                <a16:creationId xmlns:a16="http://schemas.microsoft.com/office/drawing/2014/main" id="{76E66F2E-C91C-4311-B65A-B61BFBC7CF8F}"/>
+              </a:ext>
+            </a:extLst>
+          </p:cNvPr>
+          <p:cNvPicPr>
+            <a:picLocks noChangeAspect="1"/>
+          </p:cNvPicPr>
+          <p:nvPr/>
+        </p:nvPicPr>
+        <p:blipFill>
+          <a:blip r:embed="rId3">
+            <a:extLst>
+              <a:ext uri="{28A0092B-C50C-407E-A947-70E740481C1C}">
+                <a14:useLocalDpi xmlns:a14="http://schemas.microsoft.com/office/drawing/2010/main"/>
+              </a:ext>
+            </a:extLst>
+          </a:blip>
+          <a:stretch>
+            <a:fillRect/>
+          </a:stretch>
+        </p:blipFill>
+        <p:spPr>
+          <a:xfrm>
+            <a:off x="0" y="365760"/>
+            <a:ext cx="3233668" cy="805144"/>
+          </a:xfrm>
+          <a:prstGeom prst="rect">
+            <a:avLst/>
+          </a:prstGeom>
+        </p:spPr>
+      </p:pic>
+      <p:pic>
+        <p:nvPicPr>
+          <p:cNvPr id="9" name="Picture 8" descr="Shape&#10;&#10;Description automatically generated with medium confidence">
+            <a:extLst>
+              <a:ext uri="{FF2B5EF4-FFF2-40B4-BE49-F238E27FC236}">
+                <a16:creationId xmlns:a16="http://schemas.microsoft.com/office/drawing/2014/main" id="{D4B7D9DA-40E9-9902-5E5B-3FB88A54FCE2}"/>
+              </a:ext>
+            </a:extLst>
+          </p:cNvPr>
+          <p:cNvPicPr>
+            <a:picLocks noChangeAspect="1"/>
+          </p:cNvPicPr>
+          <p:nvPr/>
+        </p:nvPicPr>
+        <p:blipFill>
+          <a:blip r:embed="rId4">
+            <a:extLst>
+              <a:ext uri="{28A0092B-C50C-407E-A947-70E740481C1C}">
+                <a14:useLocalDpi xmlns:a14="http://schemas.microsoft.com/office/drawing/2010/main" val="0"/>
+              </a:ext>
+            </a:extLst>
+          </a:blip>
+          <a:stretch>
+            <a:fillRect/>
+          </a:stretch>
+        </p:blipFill>
+        <p:spPr>
+          <a:xfrm>
+            <a:off x="4051908" y="1953266"/>
+            <a:ext cx="4088183" cy="3501050"/>
+          </a:xfrm>
+          <a:prstGeom prst="rect">
+            <a:avLst/>
+          </a:prstGeom>
+        </p:spPr>
+      </p:pic>
+    </p:spTree>
+    <p:extLst>
+      <p:ext uri="{BB962C8B-B14F-4D97-AF65-F5344CB8AC3E}">
+        <p14:creationId xmlns:p14="http://schemas.microsoft.com/office/powerpoint/2010/main" val="4119545744"/>
+      </p:ext>
+    </p:extLst>
+  </p:cSld>
+  <p:clrMapOvr>
+    <a:masterClrMapping/>
+  </p:clrMapOvr>
+  <mc:AlternateContent xmlns:mc="http://schemas.openxmlformats.org/markup-compatibility/2006" xmlns:p14="http://schemas.microsoft.com/office/powerpoint/2010/main">
+    <mc:Choice Requires="p14">
+      <p:transition spd="med" p14:dur="700">
+        <p:fade/>
+      </p:transition>
+    </mc:Choice>
+    <mc:Fallback xmlns="">
+      <p:transition spd="med">
+        <p:fade/>
+      </p:transition>
+    </mc:Fallback>
+  </mc:AlternateContent>
+</p:sld>
+</file>
+
+<file path=ppt/slides/slide11.xml><?xml version="1.0" encoding="utf-8"?>
+<p:sld xmlns:a="http://schemas.openxmlformats.org/drawingml/2006/main" xmlns:r="http://schemas.openxmlformats.org/officeDocument/2006/relationships" xmlns:p="http://schemas.openxmlformats.org/presentationml/2006/main">
+  <p:cSld>
+    <p:spTree>
+      <p:nvGrpSpPr>
+        <p:cNvPr id="1" name=""/>
+        <p:cNvGrpSpPr/>
+        <p:nvPr/>
+      </p:nvGrpSpPr>
+      <p:grpSpPr>
+        <a:xfrm>
+          <a:off x="0" y="0"/>
+          <a:ext cx="0" cy="0"/>
+          <a:chOff x="0" y="0"/>
+          <a:chExt cx="0" cy="0"/>
+        </a:xfrm>
+      </p:grpSpPr>
+      <p:pic>
+        <p:nvPicPr>
+          <p:cNvPr id="4" name="Picture 3">
+            <a:extLst>
+              <a:ext uri="{FF2B5EF4-FFF2-40B4-BE49-F238E27FC236}">
+                <a16:creationId xmlns:a16="http://schemas.microsoft.com/office/drawing/2014/main" id="{76E66F2E-C91C-4311-B65A-B61BFBC7CF8F}"/>
+              </a:ext>
+            </a:extLst>
+          </p:cNvPr>
+          <p:cNvPicPr>
+            <a:picLocks noChangeAspect="1"/>
+          </p:cNvPicPr>
+          <p:nvPr/>
+        </p:nvPicPr>
+        <p:blipFill>
+          <a:blip r:embed="rId3">
+            <a:extLst>
+              <a:ext uri="{28A0092B-C50C-407E-A947-70E740481C1C}">
+                <a14:useLocalDpi xmlns:a14="http://schemas.microsoft.com/office/drawing/2010/main"/>
+              </a:ext>
+            </a:extLst>
+          </a:blip>
+          <a:stretch>
+            <a:fillRect/>
+          </a:stretch>
+        </p:blipFill>
+        <p:spPr>
+          <a:xfrm>
+            <a:off x="0" y="365760"/>
+            <a:ext cx="3233668" cy="805144"/>
+          </a:xfrm>
+          <a:prstGeom prst="rect">
+            <a:avLst/>
+          </a:prstGeom>
+        </p:spPr>
+      </p:pic>
+      <p:pic>
+        <p:nvPicPr>
+          <p:cNvPr id="3" name="Picture 2">
+            <a:extLst>
+              <a:ext uri="{FF2B5EF4-FFF2-40B4-BE49-F238E27FC236}">
+                <a16:creationId xmlns:a16="http://schemas.microsoft.com/office/drawing/2014/main" id="{6818FEE8-D9DB-43B3-A9CB-DD82942AF9ED}"/>
+              </a:ext>
+            </a:extLst>
+          </p:cNvPr>
+          <p:cNvPicPr>
+            <a:picLocks noChangeAspect="1"/>
+          </p:cNvPicPr>
+          <p:nvPr/>
+        </p:nvPicPr>
+        <p:blipFill>
+          <a:blip r:embed="rId4">
+            <a:clrChange>
+              <a:clrFrom>
+                <a:srgbClr val="F8F9FA"/>
+              </a:clrFrom>
+              <a:clrTo>
+                <a:srgbClr val="F8F9FA">
+                  <a:alpha val="0"/>
+                </a:srgbClr>
+              </a:clrTo>
+            </a:clrChange>
+            <a:extLst>
+              <a:ext uri="{28A0092B-C50C-407E-A947-70E740481C1C}">
+                <a14:useLocalDpi xmlns:a14="http://schemas.microsoft.com/office/drawing/2010/main"/>
+              </a:ext>
+            </a:extLst>
+          </a:blip>
+          <a:stretch>
+            <a:fillRect/>
+          </a:stretch>
+        </p:blipFill>
+        <p:spPr>
+          <a:xfrm>
+            <a:off x="3767137" y="2524125"/>
+            <a:ext cx="4657725" cy="1809750"/>
+          </a:xfrm>
+          <a:prstGeom prst="rect">
+            <a:avLst/>
+          </a:prstGeom>
+        </p:spPr>
+      </p:pic>
+    </p:spTree>
+    <p:extLst>
+      <p:ext uri="{BB962C8B-B14F-4D97-AF65-F5344CB8AC3E}">
+        <p14:creationId xmlns:p14="http://schemas.microsoft.com/office/powerpoint/2010/main" val="710126279"/>
+      </p:ext>
+    </p:extLst>
+  </p:cSld>
+  <p:clrMapOvr>
+    <a:masterClrMapping/>
+  </p:clrMapOvr>
+  <mc:AlternateContent xmlns:mc="http://schemas.openxmlformats.org/markup-compatibility/2006" xmlns:p14="http://schemas.microsoft.com/office/powerpoint/2010/main">
+    <mc:Choice Requires="p14">
+      <p:transition spd="med" p14:dur="700">
+        <p:fade/>
+      </p:transition>
+    </mc:Choice>
+    <mc:Fallback xmlns="">
+      <p:transition spd="med">
+        <p:fade/>
+      </p:transition>
+    </mc:Fallback>
+  </mc:AlternateContent>
+</p:sld>
+</file>
+
+<file path=ppt/slides/slide12.xml><?xml version="1.0" encoding="utf-8"?>
+<p:sld xmlns:a="http://schemas.openxmlformats.org/drawingml/2006/main" xmlns:r="http://schemas.openxmlformats.org/officeDocument/2006/relationships" xmlns:p="http://schemas.openxmlformats.org/presentationml/2006/main">
+  <p:cSld>
+    <p:spTree>
+      <p:nvGrpSpPr>
+        <p:cNvPr id="1" name=""/>
+        <p:cNvGrpSpPr/>
+        <p:nvPr/>
+      </p:nvGrpSpPr>
+      <p:grpSpPr>
+        <a:xfrm>
+          <a:off x="0" y="0"/>
+          <a:ext cx="0" cy="0"/>
+          <a:chOff x="0" y="0"/>
+          <a:chExt cx="0" cy="0"/>
+        </a:xfrm>
+      </p:grpSpPr>
       <p:sp>
         <p:nvSpPr>
           <p:cNvPr id="9" name="Title 1">
@@ -5871,7 +6318,7 @@
 </p:sld>
 </file>
 
-<file path=ppt/slides/slide11.xml><?xml version="1.0" encoding="utf-8"?>
+<file path=ppt/slides/slide13.xml><?xml version="1.0" encoding="utf-8"?>
 <p:sld xmlns:a="http://schemas.openxmlformats.org/drawingml/2006/main" xmlns:r="http://schemas.openxmlformats.org/officeDocument/2006/relationships" xmlns:p="http://schemas.openxmlformats.org/presentationml/2006/main">
   <p:cSld>
     <p:spTree>
@@ -5913,7 +6360,7 @@
 </p:sld>
 </file>
 
-<file path=ppt/slides/slide12.xml><?xml version="1.0" encoding="utf-8"?>
+<file path=ppt/slides/slide14.xml><?xml version="1.0" encoding="utf-8"?>
 <p:sld xmlns:a="http://schemas.openxmlformats.org/drawingml/2006/main" xmlns:r="http://schemas.openxmlformats.org/officeDocument/2006/relationships" xmlns:p="http://schemas.openxmlformats.org/presentationml/2006/main">
   <p:cSld>
     <p:spTree>
@@ -6223,78 +6670,6 @@
     <p:extLst>
       <p:ext uri="{BB962C8B-B14F-4D97-AF65-F5344CB8AC3E}">
         <p14:creationId xmlns:p14="http://schemas.microsoft.com/office/powerpoint/2010/main" val="4096204018"/>
-      </p:ext>
-    </p:extLst>
-  </p:cSld>
-  <p:clrMapOvr>
-    <a:masterClrMapping/>
-  </p:clrMapOvr>
-  <mc:AlternateContent xmlns:mc="http://schemas.openxmlformats.org/markup-compatibility/2006" xmlns:p14="http://schemas.microsoft.com/office/powerpoint/2010/main">
-    <mc:Choice Requires="p14">
-      <p:transition spd="med" p14:dur="700">
-        <p:fade/>
-      </p:transition>
-    </mc:Choice>
-    <mc:Fallback xmlns="">
-      <p:transition spd="med">
-        <p:fade/>
-      </p:transition>
-    </mc:Fallback>
-  </mc:AlternateContent>
-</p:sld>
-</file>
-
-<file path=ppt/slides/slide13.xml><?xml version="1.0" encoding="utf-8"?>
-<p:sld xmlns:a="http://schemas.openxmlformats.org/drawingml/2006/main" xmlns:r="http://schemas.openxmlformats.org/officeDocument/2006/relationships" xmlns:p="http://schemas.openxmlformats.org/presentationml/2006/main">
-  <p:cSld>
-    <p:spTree>
-      <p:nvGrpSpPr>
-        <p:cNvPr id="1" name=""/>
-        <p:cNvGrpSpPr/>
-        <p:nvPr/>
-      </p:nvGrpSpPr>
-      <p:grpSpPr>
-        <a:xfrm>
-          <a:off x="0" y="0"/>
-          <a:ext cx="0" cy="0"/>
-          <a:chOff x="0" y="0"/>
-          <a:chExt cx="0" cy="0"/>
-        </a:xfrm>
-      </p:grpSpPr>
-      <p:pic>
-        <p:nvPicPr>
-          <p:cNvPr id="3" name="Picture 2">
-            <a:extLst>
-              <a:ext uri="{FF2B5EF4-FFF2-40B4-BE49-F238E27FC236}">
-                <a16:creationId xmlns:a16="http://schemas.microsoft.com/office/drawing/2014/main" id="{D4F29E86-F4EC-4823-9A43-A52FE451A52D}"/>
-              </a:ext>
-            </a:extLst>
-          </p:cNvPr>
-          <p:cNvPicPr>
-            <a:picLocks noChangeAspect="1"/>
-          </p:cNvPicPr>
-          <p:nvPr/>
-        </p:nvPicPr>
-        <p:blipFill>
-          <a:blip r:embed="rId3"/>
-          <a:stretch>
-            <a:fillRect/>
-          </a:stretch>
-        </p:blipFill>
-        <p:spPr>
-          <a:xfrm>
-            <a:off x="3333037" y="960774"/>
-            <a:ext cx="5525925" cy="5245292"/>
-          </a:xfrm>
-          <a:prstGeom prst="rect">
-            <a:avLst/>
-          </a:prstGeom>
-        </p:spPr>
-      </p:pic>
-    </p:spTree>
-    <p:extLst>
-      <p:ext uri="{BB962C8B-B14F-4D97-AF65-F5344CB8AC3E}">
-        <p14:creationId xmlns:p14="http://schemas.microsoft.com/office/powerpoint/2010/main" val="2533188322"/>
       </p:ext>
     </p:extLst>
   </p:cSld>
@@ -6714,12 +7089,59 @@
           <a:chExt cx="0" cy="0"/>
         </a:xfrm>
       </p:grpSpPr>
-      <p:sp>
-        <p:nvSpPr>
-          <p:cNvPr id="7" name="TextBox 6">
-            <a:extLst>
-              <a:ext uri="{FF2B5EF4-FFF2-40B4-BE49-F238E27FC236}">
-                <a16:creationId xmlns:a16="http://schemas.microsoft.com/office/drawing/2014/main" id="{EB45D602-67CC-4423-8D22-BDD4607E69BA}"/>
+      <p:pic>
+        <p:nvPicPr>
+          <p:cNvPr id="1026" name="Picture 2" descr="A graph denotes the output of the expression w times x plus b equals z. The output range is 0 to 1, marked along the vertical axis. The output is denoted as a step curve, which oscillates between 0 and 1.">
+            <a:extLst>
+              <a:ext uri="{FF2B5EF4-FFF2-40B4-BE49-F238E27FC236}">
+                <a16:creationId xmlns:a16="http://schemas.microsoft.com/office/drawing/2014/main" id="{4B7D400B-703B-3BC3-6705-F8CD215210D4}"/>
+              </a:ext>
+            </a:extLst>
+          </p:cNvPr>
+          <p:cNvPicPr>
+            <a:picLocks noChangeAspect="1" noChangeArrowheads="1"/>
+          </p:cNvPicPr>
+          <p:nvPr/>
+        </p:nvPicPr>
+        <p:blipFill>
+          <a:blip r:embed="rId3">
+            <a:extLst>
+              <a:ext uri="{28A0092B-C50C-407E-A947-70E740481C1C}">
+                <a14:useLocalDpi xmlns:a14="http://schemas.microsoft.com/office/drawing/2010/main" val="0"/>
+              </a:ext>
+            </a:extLst>
+          </a:blip>
+          <a:srcRect/>
+          <a:stretch>
+            <a:fillRect/>
+          </a:stretch>
+        </p:blipFill>
+        <p:spPr bwMode="auto">
+          <a:xfrm>
+            <a:off x="12304733" y="0"/>
+            <a:ext cx="1924833" cy="1187933"/>
+          </a:xfrm>
+          <a:prstGeom prst="rect">
+            <a:avLst/>
+          </a:prstGeom>
+          <a:noFill/>
+          <a:extLst>
+            <a:ext uri="{909E8E84-426E-40DD-AFC4-6F175D3DCCD1}">
+              <a14:hiddenFill xmlns:a14="http://schemas.microsoft.com/office/drawing/2010/main">
+                <a:solidFill>
+                  <a:srgbClr val="FFFFFF"/>
+                </a:solidFill>
+              </a14:hiddenFill>
+            </a:ext>
+          </a:extLst>
+        </p:spPr>
+      </p:pic>
+      <p:sp>
+        <p:nvSpPr>
+          <p:cNvPr id="3" name="TextBox 2">
+            <a:extLst>
+              <a:ext uri="{FF2B5EF4-FFF2-40B4-BE49-F238E27FC236}">
+                <a16:creationId xmlns:a16="http://schemas.microsoft.com/office/drawing/2014/main" id="{DA5F58E4-DBB0-404F-4262-284322199DB7}"/>
               </a:ext>
             </a:extLst>
           </p:cNvPr>
@@ -6753,7 +7175,7 @@
                 <a:latin typeface="+mj-lt"/>
                 <a:ea typeface="Verdana" panose="020B0604030504040204" pitchFamily="34" charset="0"/>
               </a:rPr>
-              <a:t>Source: Glassner, A. (2021). </a:t>
+              <a:t>Source: Krohn, J. et al (2020). </a:t>
             </a:r>
             <a:r>
               <a:rPr lang="en-US" sz="1400" i="1" dirty="0">
@@ -6766,7 +7188,7 @@
                 <a:latin typeface="+mj-lt"/>
                 <a:ea typeface="Verdana" panose="020B0604030504040204" pitchFamily="34" charset="0"/>
               </a:rPr>
-              <a:t>Deep learning: A visual approach</a:t>
+              <a:t>Deep learning illustrated: A visual, interactive guide to AI</a:t>
             </a:r>
             <a:r>
               <a:rPr lang="en-US" sz="1400" dirty="0">
@@ -6779,7 +7201,7 @@
                 <a:latin typeface="+mj-lt"/>
                 <a:ea typeface="Verdana" panose="020B0604030504040204" pitchFamily="34" charset="0"/>
               </a:rPr>
-              <a:t>. </a:t>
+              <a:t>. New York</a:t>
             </a:r>
             <a:r>
               <a:rPr lang="en-US" sz="1400" b="0" i="0" dirty="0">
@@ -6793,7 +7215,61 @@
                 <a:latin typeface="+mj-lt"/>
                 <a:ea typeface="Verdana" panose="020B0604030504040204" pitchFamily="34" charset="0"/>
               </a:rPr>
-              <a:t>San Francisco, CA: No Starch Press. (Chapter 13)</a:t>
+              <a:t>, NY: </a:t>
+            </a:r>
+            <a:r>
+              <a:rPr lang="en-US" sz="1400" dirty="0">
+                <a:solidFill>
+                  <a:schemeClr val="tx1">
+                    <a:lumMod val="65000"/>
+                    <a:lumOff val="35000"/>
+                  </a:schemeClr>
+                </a:solidFill>
+                <a:latin typeface="+mj-lt"/>
+                <a:ea typeface="Verdana" panose="020B0604030504040204" pitchFamily="34" charset="0"/>
+              </a:rPr>
+              <a:t>Addison-Wesley</a:t>
+            </a:r>
+            <a:r>
+              <a:rPr lang="en-US" sz="1400" b="0" i="0" dirty="0">
+                <a:solidFill>
+                  <a:schemeClr val="tx1">
+                    <a:lumMod val="65000"/>
+                    <a:lumOff val="35000"/>
+                  </a:schemeClr>
+                </a:solidFill>
+                <a:effectLst/>
+                <a:latin typeface="+mj-lt"/>
+                <a:ea typeface="Verdana" panose="020B0604030504040204" pitchFamily="34" charset="0"/>
+              </a:rPr>
+              <a:t>. (Chapter </a:t>
+            </a:r>
+            <a:r>
+              <a:rPr lang="en-US" sz="1400" dirty="0">
+                <a:solidFill>
+                  <a:schemeClr val="tx1">
+                    <a:lumMod val="65000"/>
+                    <a:lumOff val="35000"/>
+                  </a:schemeClr>
+                </a:solidFill>
+                <a:latin typeface="+mj-lt"/>
+                <a:ea typeface="Verdana" panose="020B0604030504040204" pitchFamily="34" charset="0"/>
+              </a:rPr>
+              <a:t>6</a:t>
+            </a:r>
+            <a:r>
+              <a:rPr lang="en-US" sz="1400" b="0" i="0" dirty="0">
+                <a:solidFill>
+                  <a:schemeClr val="tx1">
+                    <a:lumMod val="65000"/>
+                    <a:lumOff val="35000"/>
+                  </a:schemeClr>
+                </a:solidFill>
+                <a:effectLst/>
+                <a:latin typeface="+mj-lt"/>
+                <a:ea typeface="Verdana" panose="020B0604030504040204" pitchFamily="34" charset="0"/>
+              </a:rPr>
+              <a:t>)</a:t>
             </a:r>
             <a:endParaRPr lang="en-US" sz="1400" dirty="0">
               <a:solidFill>
@@ -6808,12 +7284,77 @@
           </a:p>
         </p:txBody>
       </p:sp>
-      <p:sp>
-        <p:nvSpPr>
-          <p:cNvPr id="2" name="TextBox 1">
-            <a:extLst>
-              <a:ext uri="{FF2B5EF4-FFF2-40B4-BE49-F238E27FC236}">
-                <a16:creationId xmlns:a16="http://schemas.microsoft.com/office/drawing/2014/main" id="{6D6347C9-9B30-444A-AE9D-B7DD51DD7144}"/>
+      <p:pic>
+        <p:nvPicPr>
+          <p:cNvPr id="4" name="Picture 3" descr="Chart, histogram&#10;&#10;Description automatically generated">
+            <a:extLst>
+              <a:ext uri="{FF2B5EF4-FFF2-40B4-BE49-F238E27FC236}">
+                <a16:creationId xmlns:a16="http://schemas.microsoft.com/office/drawing/2014/main" id="{FC6AE1FB-EA6C-713F-58C8-FB981BE4297D}"/>
+              </a:ext>
+            </a:extLst>
+          </p:cNvPr>
+          <p:cNvPicPr>
+            <a:picLocks noChangeAspect="1"/>
+          </p:cNvPicPr>
+          <p:nvPr/>
+        </p:nvPicPr>
+        <p:blipFill rotWithShape="1">
+          <a:blip r:embed="rId4">
+            <a:extLst>
+              <a:ext uri="{28A0092B-C50C-407E-A947-70E740481C1C}">
+                <a14:useLocalDpi xmlns:a14="http://schemas.microsoft.com/office/drawing/2010/main" val="0"/>
+              </a:ext>
+            </a:extLst>
+          </a:blip>
+          <a:srcRect t="10932" b="10000"/>
+          <a:stretch/>
+        </p:blipFill>
+        <p:spPr>
+          <a:xfrm>
+            <a:off x="2000250" y="749718"/>
+            <a:ext cx="7429500" cy="5422482"/>
+          </a:xfrm>
+          <a:prstGeom prst="rect">
+            <a:avLst/>
+          </a:prstGeom>
+        </p:spPr>
+      </p:pic>
+    </p:spTree>
+    <p:extLst>
+      <p:ext uri="{BB962C8B-B14F-4D97-AF65-F5344CB8AC3E}">
+        <p14:creationId xmlns:p14="http://schemas.microsoft.com/office/powerpoint/2010/main" val="199997798"/>
+      </p:ext>
+    </p:extLst>
+  </p:cSld>
+  <p:clrMapOvr>
+    <a:masterClrMapping/>
+  </p:clrMapOvr>
+</p:sld>
+</file>
+
+<file path=ppt/slides/slide4.xml><?xml version="1.0" encoding="utf-8"?>
+<p:sld xmlns:a="http://schemas.openxmlformats.org/drawingml/2006/main" xmlns:r="http://schemas.openxmlformats.org/officeDocument/2006/relationships" xmlns:p="http://schemas.openxmlformats.org/presentationml/2006/main">
+  <p:cSld>
+    <p:spTree>
+      <p:nvGrpSpPr>
+        <p:cNvPr id="1" name=""/>
+        <p:cNvGrpSpPr/>
+        <p:nvPr/>
+      </p:nvGrpSpPr>
+      <p:grpSpPr>
+        <a:xfrm>
+          <a:off x="0" y="0"/>
+          <a:ext cx="0" cy="0"/>
+          <a:chOff x="0" y="0"/>
+          <a:chExt cx="0" cy="0"/>
+        </a:xfrm>
+      </p:grpSpPr>
+      <p:sp>
+        <p:nvSpPr>
+          <p:cNvPr id="7" name="TextBox 6">
+            <a:extLst>
+              <a:ext uri="{FF2B5EF4-FFF2-40B4-BE49-F238E27FC236}">
+                <a16:creationId xmlns:a16="http://schemas.microsoft.com/office/drawing/2014/main" id="{EB45D602-67CC-4423-8D22-BDD4607E69BA}"/>
               </a:ext>
             </a:extLst>
           </p:cNvPr>
@@ -6822,7 +7363,101 @@
         </p:nvSpPr>
         <p:spPr>
           <a:xfrm>
-            <a:off x="4552121" y="5505496"/>
+            <a:off x="0" y="6550223"/>
+            <a:ext cx="12192000" cy="307777"/>
+          </a:xfrm>
+          <a:prstGeom prst="rect">
+            <a:avLst/>
+          </a:prstGeom>
+          <a:noFill/>
+        </p:spPr>
+        <p:txBody>
+          <a:bodyPr wrap="square" rtlCol="0">
+            <a:spAutoFit/>
+          </a:bodyPr>
+          <a:lstStyle/>
+          <a:p>
+            <a:r>
+              <a:rPr lang="en-US" sz="1400" dirty="0">
+                <a:solidFill>
+                  <a:schemeClr val="tx1">
+                    <a:lumMod val="65000"/>
+                    <a:lumOff val="35000"/>
+                  </a:schemeClr>
+                </a:solidFill>
+                <a:latin typeface="+mj-lt"/>
+                <a:ea typeface="Verdana" panose="020B0604030504040204" pitchFamily="34" charset="0"/>
+              </a:rPr>
+              <a:t>Source: Glassner, A. (2021). </a:t>
+            </a:r>
+            <a:r>
+              <a:rPr lang="en-US" sz="1400" i="1" dirty="0">
+                <a:solidFill>
+                  <a:schemeClr val="tx1">
+                    <a:lumMod val="65000"/>
+                    <a:lumOff val="35000"/>
+                  </a:schemeClr>
+                </a:solidFill>
+                <a:latin typeface="+mj-lt"/>
+                <a:ea typeface="Verdana" panose="020B0604030504040204" pitchFamily="34" charset="0"/>
+              </a:rPr>
+              <a:t>Deep learning: A visual approach</a:t>
+            </a:r>
+            <a:r>
+              <a:rPr lang="en-US" sz="1400" dirty="0">
+                <a:solidFill>
+                  <a:schemeClr val="tx1">
+                    <a:lumMod val="65000"/>
+                    <a:lumOff val="35000"/>
+                  </a:schemeClr>
+                </a:solidFill>
+                <a:latin typeface="+mj-lt"/>
+                <a:ea typeface="Verdana" panose="020B0604030504040204" pitchFamily="34" charset="0"/>
+              </a:rPr>
+              <a:t>. </a:t>
+            </a:r>
+            <a:r>
+              <a:rPr lang="en-US" sz="1400" b="0" i="0" dirty="0">
+                <a:solidFill>
+                  <a:schemeClr val="tx1">
+                    <a:lumMod val="65000"/>
+                    <a:lumOff val="35000"/>
+                  </a:schemeClr>
+                </a:solidFill>
+                <a:effectLst/>
+                <a:latin typeface="+mj-lt"/>
+                <a:ea typeface="Verdana" panose="020B0604030504040204" pitchFamily="34" charset="0"/>
+              </a:rPr>
+              <a:t>San Francisco, CA: No Starch Press. (Chapter 13)</a:t>
+            </a:r>
+            <a:endParaRPr lang="en-US" sz="1400" dirty="0">
+              <a:solidFill>
+                <a:schemeClr val="tx1">
+                  <a:lumMod val="65000"/>
+                  <a:lumOff val="35000"/>
+                </a:schemeClr>
+              </a:solidFill>
+              <a:latin typeface="+mj-lt"/>
+              <a:ea typeface="Verdana" panose="020B0604030504040204" pitchFamily="34" charset="0"/>
+            </a:endParaRPr>
+          </a:p>
+        </p:txBody>
+      </p:sp>
+      <p:sp>
+        <p:nvSpPr>
+          <p:cNvPr id="2" name="TextBox 1">
+            <a:extLst>
+              <a:ext uri="{FF2B5EF4-FFF2-40B4-BE49-F238E27FC236}">
+                <a16:creationId xmlns:a16="http://schemas.microsoft.com/office/drawing/2014/main" id="{6D6347C9-9B30-444A-AE9D-B7DD51DD7144}"/>
+              </a:ext>
+            </a:extLst>
+          </p:cNvPr>
+          <p:cNvSpPr txBox="1"/>
+          <p:nvPr/>
+        </p:nvSpPr>
+        <p:spPr>
+          <a:xfrm>
+            <a:off x="4552121" y="5820188"/>
             <a:ext cx="3087757" cy="461665"/>
           </a:xfrm>
           <a:prstGeom prst="rect">
@@ -6840,7 +7475,7 @@
             <a:r>
               <a:rPr lang="en-US" sz="2400" dirty="0">
                 <a:solidFill>
-                  <a:srgbClr val="4747FF"/>
+                  <a:srgbClr val="2F3361"/>
                 </a:solidFill>
                 <a:latin typeface="Courier New" panose="02070309020205020404" pitchFamily="49" charset="0"/>
                 <a:cs typeface="Courier New" panose="02070309020205020404" pitchFamily="49" charset="0"/>
@@ -6850,172 +7485,12 @@
           </a:p>
         </p:txBody>
       </p:sp>
-      <p:sp>
-        <p:nvSpPr>
-          <p:cNvPr id="3" name="TextBox 2">
-            <a:extLst>
-              <a:ext uri="{FF2B5EF4-FFF2-40B4-BE49-F238E27FC236}">
-                <a16:creationId xmlns:a16="http://schemas.microsoft.com/office/drawing/2014/main" id="{E36C76D5-706C-465F-83C4-2F7896E6FA9C}"/>
-              </a:ext>
-            </a:extLst>
-          </p:cNvPr>
-          <p:cNvSpPr txBox="1"/>
-          <p:nvPr/>
-        </p:nvSpPr>
-        <p:spPr>
-          <a:xfrm>
-            <a:off x="1848997" y="1720120"/>
-            <a:ext cx="292068" cy="307777"/>
-          </a:xfrm>
-          <a:prstGeom prst="rect">
-            <a:avLst/>
-          </a:prstGeom>
-          <a:noFill/>
-        </p:spPr>
-        <p:txBody>
-          <a:bodyPr wrap="none" rtlCol="0">
-            <a:spAutoFit/>
-          </a:bodyPr>
-          <a:lstStyle/>
-          <a:p>
-            <a:r>
-              <a:rPr lang="en-US" sz="1400" i="1" dirty="0">
-                <a:latin typeface="Courier New" panose="02070309020205020404" pitchFamily="49" charset="0"/>
-                <a:cs typeface="Courier New" panose="02070309020205020404" pitchFamily="49" charset="0"/>
-              </a:rPr>
-              <a:t>y</a:t>
-            </a:r>
-          </a:p>
-        </p:txBody>
-      </p:sp>
-      <p:sp>
-        <p:nvSpPr>
-          <p:cNvPr id="6" name="TextBox 5">
-            <a:extLst>
-              <a:ext uri="{FF2B5EF4-FFF2-40B4-BE49-F238E27FC236}">
-                <a16:creationId xmlns:a16="http://schemas.microsoft.com/office/drawing/2014/main" id="{1E8E6CF4-4B1B-4BDA-84FB-AF2614B5725F}"/>
-              </a:ext>
-            </a:extLst>
-          </p:cNvPr>
-          <p:cNvSpPr txBox="1"/>
-          <p:nvPr/>
-        </p:nvSpPr>
-        <p:spPr>
-          <a:xfrm>
-            <a:off x="4552121" y="4967744"/>
-            <a:ext cx="292068" cy="307777"/>
-          </a:xfrm>
-          <a:prstGeom prst="rect">
-            <a:avLst/>
-          </a:prstGeom>
-          <a:noFill/>
-        </p:spPr>
-        <p:txBody>
-          <a:bodyPr wrap="none" rtlCol="0">
-            <a:spAutoFit/>
-          </a:bodyPr>
-          <a:lstStyle/>
-          <a:p>
-            <a:r>
-              <a:rPr lang="en-US" sz="1400" i="1" dirty="0">
-                <a:latin typeface="Courier New" panose="02070309020205020404" pitchFamily="49" charset="0"/>
-                <a:cs typeface="Courier New" panose="02070309020205020404" pitchFamily="49" charset="0"/>
-              </a:rPr>
-              <a:t>x</a:t>
-            </a:r>
-          </a:p>
-        </p:txBody>
-      </p:sp>
-      <p:cxnSp>
-        <p:nvCxnSpPr>
-          <p:cNvPr id="5" name="Straight Connector 4">
-            <a:extLst>
-              <a:ext uri="{FF2B5EF4-FFF2-40B4-BE49-F238E27FC236}">
-                <a16:creationId xmlns:a16="http://schemas.microsoft.com/office/drawing/2014/main" id="{312A953D-FB29-49ED-80B8-01783FA3B963}"/>
-              </a:ext>
-            </a:extLst>
-          </p:cNvPr>
-          <p:cNvCxnSpPr>
-            <a:cxnSpLocks/>
-          </p:cNvCxnSpPr>
-          <p:nvPr/>
-        </p:nvCxnSpPr>
-        <p:spPr>
-          <a:xfrm>
-            <a:off x="1981779" y="2133600"/>
-            <a:ext cx="19880" cy="2986545"/>
-          </a:xfrm>
-          <a:prstGeom prst="line">
-            <a:avLst/>
-          </a:prstGeom>
-          <a:ln>
-            <a:headEnd type="arrow"/>
-          </a:ln>
-        </p:spPr>
-        <p:style>
-          <a:lnRef idx="1">
-            <a:schemeClr val="accent1"/>
-          </a:lnRef>
-          <a:fillRef idx="0">
-            <a:schemeClr val="accent1"/>
-          </a:fillRef>
-          <a:effectRef idx="0">
-            <a:schemeClr val="accent1"/>
-          </a:effectRef>
-          <a:fontRef idx="minor">
-            <a:schemeClr val="tx1"/>
-          </a:fontRef>
-        </p:style>
-      </p:cxnSp>
-      <p:cxnSp>
-        <p:nvCxnSpPr>
-          <p:cNvPr id="9" name="Straight Connector 8">
-            <a:extLst>
-              <a:ext uri="{FF2B5EF4-FFF2-40B4-BE49-F238E27FC236}">
-                <a16:creationId xmlns:a16="http://schemas.microsoft.com/office/drawing/2014/main" id="{24A48692-27F5-469B-BACF-B0ADB29E0832}"/>
-              </a:ext>
-            </a:extLst>
-          </p:cNvPr>
-          <p:cNvCxnSpPr>
-            <a:cxnSpLocks/>
-            <a:stCxn id="6" idx="1"/>
-          </p:cNvCxnSpPr>
-          <p:nvPr/>
-        </p:nvCxnSpPr>
-        <p:spPr>
-          <a:xfrm flipH="1" flipV="1">
-            <a:off x="2001659" y="5120145"/>
-            <a:ext cx="2550462" cy="1488"/>
-          </a:xfrm>
-          <a:prstGeom prst="line">
-            <a:avLst/>
-          </a:prstGeom>
-          <a:ln>
-            <a:headEnd type="arrow"/>
-            <a:tailEnd type="none"/>
-          </a:ln>
-        </p:spPr>
-        <p:style>
-          <a:lnRef idx="1">
-            <a:schemeClr val="accent1"/>
-          </a:lnRef>
-          <a:fillRef idx="0">
-            <a:schemeClr val="accent1"/>
-          </a:fillRef>
-          <a:effectRef idx="0">
-            <a:schemeClr val="accent1"/>
-          </a:effectRef>
-          <a:fontRef idx="minor">
-            <a:schemeClr val="tx1"/>
-          </a:fontRef>
-        </p:style>
-      </p:cxnSp>
       <p:pic>
         <p:nvPicPr>
-          <p:cNvPr id="8" name="Picture 7" descr="Chart&#10;&#10;Description automatically generated">
-            <a:extLst>
-              <a:ext uri="{FF2B5EF4-FFF2-40B4-BE49-F238E27FC236}">
-                <a16:creationId xmlns:a16="http://schemas.microsoft.com/office/drawing/2014/main" id="{0CB4695C-9BBB-44CB-8105-2908ACD5F37C}"/>
+          <p:cNvPr id="10" name="Picture 9" descr="Chart, line chart&#10;&#10;Description automatically generated">
+            <a:extLst>
+              <a:ext uri="{FF2B5EF4-FFF2-40B4-BE49-F238E27FC236}">
+                <a16:creationId xmlns:a16="http://schemas.microsoft.com/office/drawing/2014/main" id="{1153D44B-AF2C-882C-D746-32585C2FC40F}"/>
               </a:ext>
             </a:extLst>
           </p:cNvPr>
@@ -7024,7 +7499,7 @@
           </p:cNvPicPr>
           <p:nvPr/>
         </p:nvPicPr>
-        <p:blipFill>
+        <p:blipFill rotWithShape="1">
           <a:blip r:embed="rId3">
             <a:extLst>
               <a:ext uri="{28A0092B-C50C-407E-A947-70E740481C1C}">
@@ -7032,14 +7507,13 @@
               </a:ext>
             </a:extLst>
           </a:blip>
-          <a:stretch>
-            <a:fillRect/>
-          </a:stretch>
+          <a:srcRect l="1035" r="6535"/>
+          <a:stretch/>
         </p:blipFill>
         <p:spPr>
           <a:xfrm>
-            <a:off x="2114561" y="2257872"/>
-            <a:ext cx="8211827" cy="2696502"/>
+            <a:off x="303209" y="1037812"/>
+            <a:ext cx="11394621" cy="4782376"/>
           </a:xfrm>
           <a:prstGeom prst="rect">
             <a:avLst/>
@@ -7157,189 +7631,6 @@
 </p:sld>
 </file>
 
-<file path=ppt/slides/slide4.xml><?xml version="1.0" encoding="utf-8"?>
-<p:sld xmlns:a="http://schemas.openxmlformats.org/drawingml/2006/main" xmlns:r="http://schemas.openxmlformats.org/officeDocument/2006/relationships" xmlns:p="http://schemas.openxmlformats.org/presentationml/2006/main">
-  <p:cSld>
-    <p:spTree>
-      <p:nvGrpSpPr>
-        <p:cNvPr id="1" name=""/>
-        <p:cNvGrpSpPr/>
-        <p:nvPr/>
-      </p:nvGrpSpPr>
-      <p:grpSpPr>
-        <a:xfrm>
-          <a:off x="0" y="0"/>
-          <a:ext cx="0" cy="0"/>
-          <a:chOff x="0" y="0"/>
-          <a:chExt cx="0" cy="0"/>
-        </a:xfrm>
-      </p:grpSpPr>
-      <p:sp>
-        <p:nvSpPr>
-          <p:cNvPr id="4" name="TextBox 3">
-            <a:extLst>
-              <a:ext uri="{FF2B5EF4-FFF2-40B4-BE49-F238E27FC236}">
-                <a16:creationId xmlns:a16="http://schemas.microsoft.com/office/drawing/2014/main" id="{5D509CE6-8D0C-486C-BA0E-1B557584FCB2}"/>
-              </a:ext>
-            </a:extLst>
-          </p:cNvPr>
-          <p:cNvSpPr txBox="1"/>
-          <p:nvPr/>
-        </p:nvSpPr>
-        <p:spPr>
-          <a:xfrm>
-            <a:off x="0" y="6550223"/>
-            <a:ext cx="12192000" cy="307777"/>
-          </a:xfrm>
-          <a:prstGeom prst="rect">
-            <a:avLst/>
-          </a:prstGeom>
-          <a:noFill/>
-        </p:spPr>
-        <p:txBody>
-          <a:bodyPr wrap="square" rtlCol="0">
-            <a:spAutoFit/>
-          </a:bodyPr>
-          <a:lstStyle/>
-          <a:p>
-            <a:r>
-              <a:rPr lang="en-US" sz="1400" dirty="0">
-                <a:solidFill>
-                  <a:schemeClr val="tx1">
-                    <a:lumMod val="65000"/>
-                    <a:lumOff val="35000"/>
-                  </a:schemeClr>
-                </a:solidFill>
-                <a:latin typeface="+mj-lt"/>
-                <a:ea typeface="Verdana" panose="020B0604030504040204" pitchFamily="34" charset="0"/>
-              </a:rPr>
-              <a:t>Source: Glassner, A. (2021). </a:t>
-            </a:r>
-            <a:r>
-              <a:rPr lang="en-US" sz="1400" i="1" dirty="0">
-                <a:solidFill>
-                  <a:schemeClr val="tx1">
-                    <a:lumMod val="65000"/>
-                    <a:lumOff val="35000"/>
-                  </a:schemeClr>
-                </a:solidFill>
-                <a:latin typeface="+mj-lt"/>
-                <a:ea typeface="Verdana" panose="020B0604030504040204" pitchFamily="34" charset="0"/>
-              </a:rPr>
-              <a:t>Deep learning: A visual approach</a:t>
-            </a:r>
-            <a:r>
-              <a:rPr lang="en-US" sz="1400" dirty="0">
-                <a:solidFill>
-                  <a:schemeClr val="tx1">
-                    <a:lumMod val="65000"/>
-                    <a:lumOff val="35000"/>
-                  </a:schemeClr>
-                </a:solidFill>
-                <a:latin typeface="+mj-lt"/>
-                <a:ea typeface="Verdana" panose="020B0604030504040204" pitchFamily="34" charset="0"/>
-              </a:rPr>
-              <a:t>. </a:t>
-            </a:r>
-            <a:r>
-              <a:rPr lang="en-US" sz="1400" b="0" i="0" dirty="0">
-                <a:solidFill>
-                  <a:schemeClr val="tx1">
-                    <a:lumMod val="65000"/>
-                    <a:lumOff val="35000"/>
-                  </a:schemeClr>
-                </a:solidFill>
-                <a:effectLst/>
-                <a:latin typeface="+mj-lt"/>
-                <a:ea typeface="Verdana" panose="020B0604030504040204" pitchFamily="34" charset="0"/>
-              </a:rPr>
-              <a:t>San Francisco, CA: No Starch Press. (Chapter 13)</a:t>
-            </a:r>
-            <a:endParaRPr lang="en-US" sz="1400" dirty="0">
-              <a:solidFill>
-                <a:schemeClr val="tx1">
-                  <a:lumMod val="65000"/>
-                  <a:lumOff val="35000"/>
-                </a:schemeClr>
-              </a:solidFill>
-              <a:latin typeface="+mj-lt"/>
-              <a:ea typeface="Verdana" panose="020B0604030504040204" pitchFamily="34" charset="0"/>
-            </a:endParaRPr>
-          </a:p>
-        </p:txBody>
-      </p:sp>
-      <p:pic>
-        <p:nvPicPr>
-          <p:cNvPr id="5" name="Picture 2" descr="F13023">
-            <a:extLst>
-              <a:ext uri="{FF2B5EF4-FFF2-40B4-BE49-F238E27FC236}">
-                <a16:creationId xmlns:a16="http://schemas.microsoft.com/office/drawing/2014/main" id="{8228750C-0D30-4367-BD35-78C99F4E179D}"/>
-              </a:ext>
-            </a:extLst>
-          </p:cNvPr>
-          <p:cNvPicPr>
-            <a:picLocks noChangeAspect="1" noChangeArrowheads="1"/>
-          </p:cNvPicPr>
-          <p:nvPr/>
-        </p:nvPicPr>
-        <p:blipFill>
-          <a:blip r:embed="rId3">
-            <a:extLst>
-              <a:ext uri="{28A0092B-C50C-407E-A947-70E740481C1C}">
-                <a14:useLocalDpi xmlns:a14="http://schemas.microsoft.com/office/drawing/2010/main" val="0"/>
-              </a:ext>
-            </a:extLst>
-          </a:blip>
-          <a:srcRect/>
-          <a:stretch>
-            <a:fillRect/>
-          </a:stretch>
-        </p:blipFill>
-        <p:spPr bwMode="auto">
-          <a:xfrm>
-            <a:off x="3661891" y="909334"/>
-            <a:ext cx="4868217" cy="5039331"/>
-          </a:xfrm>
-          <a:prstGeom prst="rect">
-            <a:avLst/>
-          </a:prstGeom>
-          <a:noFill/>
-          <a:extLst>
-            <a:ext uri="{909E8E84-426E-40DD-AFC4-6F175D3DCCD1}">
-              <a14:hiddenFill xmlns:a14="http://schemas.microsoft.com/office/drawing/2010/main">
-                <a:solidFill>
-                  <a:srgbClr val="FFFFFF"/>
-                </a:solidFill>
-              </a14:hiddenFill>
-            </a:ext>
-          </a:extLst>
-        </p:spPr>
-      </p:pic>
-    </p:spTree>
-    <p:extLst>
-      <p:ext uri="{BB962C8B-B14F-4D97-AF65-F5344CB8AC3E}">
-        <p14:creationId xmlns:p14="http://schemas.microsoft.com/office/powerpoint/2010/main" val="3540474055"/>
-      </p:ext>
-    </p:extLst>
-  </p:cSld>
-  <p:clrMapOvr>
-    <a:masterClrMapping/>
-  </p:clrMapOvr>
-  <mc:AlternateContent xmlns:mc="http://schemas.openxmlformats.org/markup-compatibility/2006" xmlns:p14="http://schemas.microsoft.com/office/powerpoint/2010/main">
-    <mc:Choice Requires="p14">
-      <p:transition spd="med" p14:dur="700">
-        <p:fade/>
-      </p:transition>
-    </mc:Choice>
-    <mc:Fallback xmlns="">
-      <p:transition spd="med">
-        <p:fade/>
-      </p:transition>
-    </mc:Fallback>
-  </mc:AlternateContent>
-</p:sld>
-</file>
-
 <file path=ppt/slides/slide5.xml><?xml version="1.0" encoding="utf-8"?>
 <p:sld xmlns:a="http://schemas.openxmlformats.org/drawingml/2006/main" xmlns:r="http://schemas.openxmlformats.org/officeDocument/2006/relationships" xmlns:p="http://schemas.openxmlformats.org/presentationml/2006/main">
   <p:cSld>
@@ -7453,10 +7744,10 @@
       </p:sp>
       <p:pic>
         <p:nvPicPr>
-          <p:cNvPr id="3074" name="Picture 2" descr="F13031">
-            <a:extLst>
-              <a:ext uri="{FF2B5EF4-FFF2-40B4-BE49-F238E27FC236}">
-                <a16:creationId xmlns:a16="http://schemas.microsoft.com/office/drawing/2014/main" id="{FE32D917-19C8-425A-8F62-32045418BE85}"/>
+          <p:cNvPr id="3074" name="Picture 2" descr="A graph represents the ReLU activation function.">
+            <a:extLst>
+              <a:ext uri="{FF2B5EF4-FFF2-40B4-BE49-F238E27FC236}">
+                <a16:creationId xmlns:a16="http://schemas.microsoft.com/office/drawing/2014/main" id="{FB881738-454E-22F6-E572-67299628381B}"/>
               </a:ext>
             </a:extLst>
           </p:cNvPr>
@@ -7480,8 +7771,8 @@
         </p:blipFill>
         <p:spPr bwMode="auto">
           <a:xfrm>
-            <a:off x="3661891" y="969849"/>
-            <a:ext cx="4868217" cy="4918302"/>
+            <a:off x="12304735" y="0"/>
+            <a:ext cx="2070001" cy="1090357"/>
           </a:xfrm>
           <a:prstGeom prst="rect">
             <a:avLst/>
@@ -7498,10 +7789,45 @@
           </a:extLst>
         </p:spPr>
       </p:pic>
+      <p:pic>
+        <p:nvPicPr>
+          <p:cNvPr id="6" name="Picture 5" descr="Chart&#10;&#10;Description automatically generated">
+            <a:extLst>
+              <a:ext uri="{FF2B5EF4-FFF2-40B4-BE49-F238E27FC236}">
+                <a16:creationId xmlns:a16="http://schemas.microsoft.com/office/drawing/2014/main" id="{B4F6A46C-649E-CE88-BFBF-83F9ADFAF1ED}"/>
+              </a:ext>
+            </a:extLst>
+          </p:cNvPr>
+          <p:cNvPicPr>
+            <a:picLocks noChangeAspect="1"/>
+          </p:cNvPicPr>
+          <p:nvPr/>
+        </p:nvPicPr>
+        <p:blipFill rotWithShape="1">
+          <a:blip r:embed="rId4">
+            <a:extLst>
+              <a:ext uri="{28A0092B-C50C-407E-A947-70E740481C1C}">
+                <a14:useLocalDpi xmlns:a14="http://schemas.microsoft.com/office/drawing/2010/main" val="0"/>
+              </a:ext>
+            </a:extLst>
+          </a:blip>
+          <a:srcRect t="4673"/>
+          <a:stretch/>
+        </p:blipFill>
+        <p:spPr>
+          <a:xfrm>
+            <a:off x="2209800" y="171450"/>
+            <a:ext cx="6810900" cy="6378773"/>
+          </a:xfrm>
+          <a:prstGeom prst="rect">
+            <a:avLst/>
+          </a:prstGeom>
+        </p:spPr>
+      </p:pic>
     </p:spTree>
     <p:extLst>
       <p:ext uri="{BB962C8B-B14F-4D97-AF65-F5344CB8AC3E}">
-        <p14:creationId xmlns:p14="http://schemas.microsoft.com/office/powerpoint/2010/main" val="207206121"/>
+        <p14:creationId xmlns:p14="http://schemas.microsoft.com/office/powerpoint/2010/main" val="3540474055"/>
       </p:ext>
     </p:extLst>
   </p:cSld>
@@ -7636,10 +7962,10 @@
       </p:sp>
       <p:pic>
         <p:nvPicPr>
-          <p:cNvPr id="4098" name="Picture 2" descr="F13032">
-            <a:extLst>
-              <a:ext uri="{FF2B5EF4-FFF2-40B4-BE49-F238E27FC236}">
-                <a16:creationId xmlns:a16="http://schemas.microsoft.com/office/drawing/2014/main" id="{AE6316DE-1ED1-4A08-B4D7-CEFE16BD119E}"/>
+          <p:cNvPr id="1026" name="Picture 2" descr="A graph represents the sigmoid activation function.">
+            <a:extLst>
+              <a:ext uri="{FF2B5EF4-FFF2-40B4-BE49-F238E27FC236}">
+                <a16:creationId xmlns:a16="http://schemas.microsoft.com/office/drawing/2014/main" id="{AC37AACC-2320-AC40-A743-C09CE4716C65}"/>
               </a:ext>
             </a:extLst>
           </p:cNvPr>
@@ -7663,8 +7989,8 @@
         </p:blipFill>
         <p:spPr bwMode="auto">
           <a:xfrm>
-            <a:off x="3781425" y="1047750"/>
-            <a:ext cx="4629150" cy="4762500"/>
+            <a:off x="12279682" y="-1"/>
+            <a:ext cx="2286466" cy="1540701"/>
           </a:xfrm>
           <a:prstGeom prst="rect">
             <a:avLst/>
@@ -7679,6 +8005,259 @@
               </a14:hiddenFill>
             </a:ext>
           </a:extLst>
+        </p:spPr>
+      </p:pic>
+      <p:pic>
+        <p:nvPicPr>
+          <p:cNvPr id="5" name="Picture 4" descr="Chart&#10;&#10;Description automatically generated">
+            <a:extLst>
+              <a:ext uri="{FF2B5EF4-FFF2-40B4-BE49-F238E27FC236}">
+                <a16:creationId xmlns:a16="http://schemas.microsoft.com/office/drawing/2014/main" id="{4BC26F65-2CC6-2501-60AC-F3CD645FA1CE}"/>
+              </a:ext>
+            </a:extLst>
+          </p:cNvPr>
+          <p:cNvPicPr>
+            <a:picLocks noChangeAspect="1"/>
+          </p:cNvPicPr>
+          <p:nvPr/>
+        </p:nvPicPr>
+        <p:blipFill rotWithShape="1">
+          <a:blip r:embed="rId4">
+            <a:extLst>
+              <a:ext uri="{28A0092B-C50C-407E-A947-70E740481C1C}">
+                <a14:useLocalDpi xmlns:a14="http://schemas.microsoft.com/office/drawing/2010/main" val="0"/>
+              </a:ext>
+            </a:extLst>
+          </a:blip>
+          <a:srcRect t="4445"/>
+          <a:stretch/>
+        </p:blipFill>
+        <p:spPr>
+          <a:xfrm>
+            <a:off x="2426079" y="304800"/>
+            <a:ext cx="7022721" cy="6270066"/>
+          </a:xfrm>
+          <a:prstGeom prst="rect">
+            <a:avLst/>
+          </a:prstGeom>
+        </p:spPr>
+      </p:pic>
+    </p:spTree>
+    <p:extLst>
+      <p:ext uri="{BB962C8B-B14F-4D97-AF65-F5344CB8AC3E}">
+        <p14:creationId xmlns:p14="http://schemas.microsoft.com/office/powerpoint/2010/main" val="207206121"/>
+      </p:ext>
+    </p:extLst>
+  </p:cSld>
+  <p:clrMapOvr>
+    <a:masterClrMapping/>
+  </p:clrMapOvr>
+  <mc:AlternateContent xmlns:mc="http://schemas.openxmlformats.org/markup-compatibility/2006" xmlns:p14="http://schemas.microsoft.com/office/powerpoint/2010/main">
+    <mc:Choice Requires="p14">
+      <p:transition spd="med" p14:dur="700">
+        <p:fade/>
+      </p:transition>
+    </mc:Choice>
+    <mc:Fallback xmlns="">
+      <p:transition spd="med">
+        <p:fade/>
+      </p:transition>
+    </mc:Fallback>
+  </mc:AlternateContent>
+</p:sld>
+</file>
+
+<file path=ppt/slides/slide7.xml><?xml version="1.0" encoding="utf-8"?>
+<p:sld xmlns:a="http://schemas.openxmlformats.org/drawingml/2006/main" xmlns:r="http://schemas.openxmlformats.org/officeDocument/2006/relationships" xmlns:p="http://schemas.openxmlformats.org/presentationml/2006/main">
+  <p:cSld>
+    <p:spTree>
+      <p:nvGrpSpPr>
+        <p:cNvPr id="1" name=""/>
+        <p:cNvGrpSpPr/>
+        <p:nvPr/>
+      </p:nvGrpSpPr>
+      <p:grpSpPr>
+        <a:xfrm>
+          <a:off x="0" y="0"/>
+          <a:ext cx="0" cy="0"/>
+          <a:chOff x="0" y="0"/>
+          <a:chExt cx="0" cy="0"/>
+        </a:xfrm>
+      </p:grpSpPr>
+      <p:sp>
+        <p:nvSpPr>
+          <p:cNvPr id="4" name="TextBox 3">
+            <a:extLst>
+              <a:ext uri="{FF2B5EF4-FFF2-40B4-BE49-F238E27FC236}">
+                <a16:creationId xmlns:a16="http://schemas.microsoft.com/office/drawing/2014/main" id="{5D509CE6-8D0C-486C-BA0E-1B557584FCB2}"/>
+              </a:ext>
+            </a:extLst>
+          </p:cNvPr>
+          <p:cNvSpPr txBox="1"/>
+          <p:nvPr/>
+        </p:nvSpPr>
+        <p:spPr>
+          <a:xfrm>
+            <a:off x="0" y="6550223"/>
+            <a:ext cx="12192000" cy="307777"/>
+          </a:xfrm>
+          <a:prstGeom prst="rect">
+            <a:avLst/>
+          </a:prstGeom>
+          <a:noFill/>
+        </p:spPr>
+        <p:txBody>
+          <a:bodyPr wrap="square" rtlCol="0">
+            <a:spAutoFit/>
+          </a:bodyPr>
+          <a:lstStyle/>
+          <a:p>
+            <a:r>
+              <a:rPr lang="en-US" sz="1400" dirty="0">
+                <a:solidFill>
+                  <a:schemeClr val="tx1">
+                    <a:lumMod val="65000"/>
+                    <a:lumOff val="35000"/>
+                  </a:schemeClr>
+                </a:solidFill>
+                <a:latin typeface="+mj-lt"/>
+                <a:ea typeface="Verdana" panose="020B0604030504040204" pitchFamily="34" charset="0"/>
+              </a:rPr>
+              <a:t>Source: Glassner, A. (2021). </a:t>
+            </a:r>
+            <a:r>
+              <a:rPr lang="en-US" sz="1400" i="1" dirty="0">
+                <a:solidFill>
+                  <a:schemeClr val="tx1">
+                    <a:lumMod val="65000"/>
+                    <a:lumOff val="35000"/>
+                  </a:schemeClr>
+                </a:solidFill>
+                <a:latin typeface="+mj-lt"/>
+                <a:ea typeface="Verdana" panose="020B0604030504040204" pitchFamily="34" charset="0"/>
+              </a:rPr>
+              <a:t>Deep learning: A visual approach</a:t>
+            </a:r>
+            <a:r>
+              <a:rPr lang="en-US" sz="1400" dirty="0">
+                <a:solidFill>
+                  <a:schemeClr val="tx1">
+                    <a:lumMod val="65000"/>
+                    <a:lumOff val="35000"/>
+                  </a:schemeClr>
+                </a:solidFill>
+                <a:latin typeface="+mj-lt"/>
+                <a:ea typeface="Verdana" panose="020B0604030504040204" pitchFamily="34" charset="0"/>
+              </a:rPr>
+              <a:t>. </a:t>
+            </a:r>
+            <a:r>
+              <a:rPr lang="en-US" sz="1400" b="0" i="0" dirty="0">
+                <a:solidFill>
+                  <a:schemeClr val="tx1">
+                    <a:lumMod val="65000"/>
+                    <a:lumOff val="35000"/>
+                  </a:schemeClr>
+                </a:solidFill>
+                <a:effectLst/>
+                <a:latin typeface="+mj-lt"/>
+                <a:ea typeface="Verdana" panose="020B0604030504040204" pitchFamily="34" charset="0"/>
+              </a:rPr>
+              <a:t>San Francisco, CA: No Starch Press. (Chapter 13)</a:t>
+            </a:r>
+            <a:endParaRPr lang="en-US" sz="1400" dirty="0">
+              <a:solidFill>
+                <a:schemeClr val="tx1">
+                  <a:lumMod val="65000"/>
+                  <a:lumOff val="35000"/>
+                </a:schemeClr>
+              </a:solidFill>
+              <a:latin typeface="+mj-lt"/>
+              <a:ea typeface="Verdana" panose="020B0604030504040204" pitchFamily="34" charset="0"/>
+            </a:endParaRPr>
+          </a:p>
+        </p:txBody>
+      </p:sp>
+      <p:pic>
+        <p:nvPicPr>
+          <p:cNvPr id="2050" name="Picture 2" descr="A graph represents the tan hyperbolic h activation function.">
+            <a:extLst>
+              <a:ext uri="{FF2B5EF4-FFF2-40B4-BE49-F238E27FC236}">
+                <a16:creationId xmlns:a16="http://schemas.microsoft.com/office/drawing/2014/main" id="{26252BC7-03E8-5301-369B-05EE470EF1DC}"/>
+              </a:ext>
+            </a:extLst>
+          </p:cNvPr>
+          <p:cNvPicPr>
+            <a:picLocks noChangeAspect="1" noChangeArrowheads="1"/>
+          </p:cNvPicPr>
+          <p:nvPr/>
+        </p:nvPicPr>
+        <p:blipFill>
+          <a:blip r:embed="rId3">
+            <a:extLst>
+              <a:ext uri="{28A0092B-C50C-407E-A947-70E740481C1C}">
+                <a14:useLocalDpi xmlns:a14="http://schemas.microsoft.com/office/drawing/2010/main" val="0"/>
+              </a:ext>
+            </a:extLst>
+          </a:blip>
+          <a:srcRect/>
+          <a:stretch>
+            <a:fillRect/>
+          </a:stretch>
+        </p:blipFill>
+        <p:spPr bwMode="auto">
+          <a:xfrm>
+            <a:off x="12292208" y="0"/>
+            <a:ext cx="2232719" cy="1504485"/>
+          </a:xfrm>
+          <a:prstGeom prst="rect">
+            <a:avLst/>
+          </a:prstGeom>
+          <a:noFill/>
+          <a:extLst>
+            <a:ext uri="{909E8E84-426E-40DD-AFC4-6F175D3DCCD1}">
+              <a14:hiddenFill xmlns:a14="http://schemas.microsoft.com/office/drawing/2010/main">
+                <a:solidFill>
+                  <a:srgbClr val="FFFFFF"/>
+                </a:solidFill>
+              </a14:hiddenFill>
+            </a:ext>
+          </a:extLst>
+        </p:spPr>
+      </p:pic>
+      <p:pic>
+        <p:nvPicPr>
+          <p:cNvPr id="5" name="Picture 4">
+            <a:extLst>
+              <a:ext uri="{FF2B5EF4-FFF2-40B4-BE49-F238E27FC236}">
+                <a16:creationId xmlns:a16="http://schemas.microsoft.com/office/drawing/2014/main" id="{63C27AEC-A19F-0AB7-8D8C-2AC325727C9F}"/>
+              </a:ext>
+            </a:extLst>
+          </p:cNvPr>
+          <p:cNvPicPr>
+            <a:picLocks noChangeAspect="1"/>
+          </p:cNvPicPr>
+          <p:nvPr/>
+        </p:nvPicPr>
+        <p:blipFill rotWithShape="1">
+          <a:blip r:embed="rId4">
+            <a:extLst>
+              <a:ext uri="{28A0092B-C50C-407E-A947-70E740481C1C}">
+                <a14:useLocalDpi xmlns:a14="http://schemas.microsoft.com/office/drawing/2010/main" val="0"/>
+              </a:ext>
+            </a:extLst>
+          </a:blip>
+          <a:srcRect t="5556" b="2500"/>
+          <a:stretch/>
+        </p:blipFill>
+        <p:spPr>
+          <a:xfrm>
+            <a:off x="2433736" y="0"/>
+            <a:ext cx="6981627" cy="6550223"/>
+          </a:xfrm>
+          <a:prstGeom prst="rect">
+            <a:avLst/>
+          </a:prstGeom>
         </p:spPr>
       </p:pic>
     </p:spTree>
@@ -7706,7 +8285,7 @@
 </p:sld>
 </file>
 
-<file path=ppt/slides/slide7.xml><?xml version="1.0" encoding="utf-8"?>
+<file path=ppt/slides/slide8.xml><?xml version="1.0" encoding="utf-8"?>
 <p:sld xmlns:a="http://schemas.openxmlformats.org/drawingml/2006/main" xmlns:r="http://schemas.openxmlformats.org/officeDocument/2006/relationships" xmlns:p="http://schemas.openxmlformats.org/presentationml/2006/main">
   <p:cSld>
     <p:spTree>
@@ -8020,7 +8599,7 @@
 </p:sld>
 </file>
 
-<file path=ppt/slides/slide8.xml><?xml version="1.0" encoding="utf-8"?>
+<file path=ppt/slides/slide9.xml><?xml version="1.0" encoding="utf-8"?>
 <p:sld xmlns:a="http://schemas.openxmlformats.org/drawingml/2006/main" xmlns:r="http://schemas.openxmlformats.org/officeDocument/2006/relationships" xmlns:p="http://schemas.openxmlformats.org/presentationml/2006/main">
   <p:cSld>
     <p:spTree>
@@ -8182,130 +8761,6 @@
     <p:extLst>
       <p:ext uri="{BB962C8B-B14F-4D97-AF65-F5344CB8AC3E}">
         <p14:creationId xmlns:p14="http://schemas.microsoft.com/office/powerpoint/2010/main" val="2177157636"/>
-      </p:ext>
-    </p:extLst>
-  </p:cSld>
-  <p:clrMapOvr>
-    <a:masterClrMapping/>
-  </p:clrMapOvr>
-  <mc:AlternateContent xmlns:mc="http://schemas.openxmlformats.org/markup-compatibility/2006" xmlns:p14="http://schemas.microsoft.com/office/powerpoint/2010/main">
-    <mc:Choice Requires="p14">
-      <p:transition spd="med" p14:dur="700">
-        <p:fade/>
-      </p:transition>
-    </mc:Choice>
-    <mc:Fallback xmlns="">
-      <p:transition spd="med">
-        <p:fade/>
-      </p:transition>
-    </mc:Fallback>
-  </mc:AlternateContent>
-</p:sld>
-</file>
-
-<file path=ppt/slides/slide9.xml><?xml version="1.0" encoding="utf-8"?>
-<p:sld xmlns:a="http://schemas.openxmlformats.org/drawingml/2006/main" xmlns:r="http://schemas.openxmlformats.org/officeDocument/2006/relationships" xmlns:p="http://schemas.openxmlformats.org/presentationml/2006/main">
-  <p:cSld>
-    <p:spTree>
-      <p:nvGrpSpPr>
-        <p:cNvPr id="1" name=""/>
-        <p:cNvGrpSpPr/>
-        <p:nvPr/>
-      </p:nvGrpSpPr>
-      <p:grpSpPr>
-        <a:xfrm>
-          <a:off x="0" y="0"/>
-          <a:ext cx="0" cy="0"/>
-          <a:chOff x="0" y="0"/>
-          <a:chExt cx="0" cy="0"/>
-        </a:xfrm>
-      </p:grpSpPr>
-      <p:pic>
-        <p:nvPicPr>
-          <p:cNvPr id="4" name="Picture 3">
-            <a:extLst>
-              <a:ext uri="{FF2B5EF4-FFF2-40B4-BE49-F238E27FC236}">
-                <a16:creationId xmlns:a16="http://schemas.microsoft.com/office/drawing/2014/main" id="{76E66F2E-C91C-4311-B65A-B61BFBC7CF8F}"/>
-              </a:ext>
-            </a:extLst>
-          </p:cNvPr>
-          <p:cNvPicPr>
-            <a:picLocks noChangeAspect="1"/>
-          </p:cNvPicPr>
-          <p:nvPr/>
-        </p:nvPicPr>
-        <p:blipFill>
-          <a:blip r:embed="rId3">
-            <a:extLst>
-              <a:ext uri="{28A0092B-C50C-407E-A947-70E740481C1C}">
-                <a14:useLocalDpi xmlns:a14="http://schemas.microsoft.com/office/drawing/2010/main"/>
-              </a:ext>
-            </a:extLst>
-          </a:blip>
-          <a:stretch>
-            <a:fillRect/>
-          </a:stretch>
-        </p:blipFill>
-        <p:spPr>
-          <a:xfrm>
-            <a:off x="0" y="365760"/>
-            <a:ext cx="3233668" cy="805144"/>
-          </a:xfrm>
-          <a:prstGeom prst="rect">
-            <a:avLst/>
-          </a:prstGeom>
-        </p:spPr>
-      </p:pic>
-      <p:pic>
-        <p:nvPicPr>
-          <p:cNvPr id="3" name="Picture 2">
-            <a:extLst>
-              <a:ext uri="{FF2B5EF4-FFF2-40B4-BE49-F238E27FC236}">
-                <a16:creationId xmlns:a16="http://schemas.microsoft.com/office/drawing/2014/main" id="{6818FEE8-D9DB-43B3-A9CB-DD82942AF9ED}"/>
-              </a:ext>
-            </a:extLst>
-          </p:cNvPr>
-          <p:cNvPicPr>
-            <a:picLocks noChangeAspect="1"/>
-          </p:cNvPicPr>
-          <p:nvPr/>
-        </p:nvPicPr>
-        <p:blipFill>
-          <a:blip r:embed="rId4">
-            <a:clrChange>
-              <a:clrFrom>
-                <a:srgbClr val="F8F9FA"/>
-              </a:clrFrom>
-              <a:clrTo>
-                <a:srgbClr val="F8F9FA">
-                  <a:alpha val="0"/>
-                </a:srgbClr>
-              </a:clrTo>
-            </a:clrChange>
-            <a:extLst>
-              <a:ext uri="{28A0092B-C50C-407E-A947-70E740481C1C}">
-                <a14:useLocalDpi xmlns:a14="http://schemas.microsoft.com/office/drawing/2010/main"/>
-              </a:ext>
-            </a:extLst>
-          </a:blip>
-          <a:stretch>
-            <a:fillRect/>
-          </a:stretch>
-        </p:blipFill>
-        <p:spPr>
-          <a:xfrm>
-            <a:off x="3767137" y="2524125"/>
-            <a:ext cx="4657725" cy="1809750"/>
-          </a:xfrm>
-          <a:prstGeom prst="rect">
-            <a:avLst/>
-          </a:prstGeom>
-        </p:spPr>
-      </p:pic>
-    </p:spTree>
-    <p:extLst>
-      <p:ext uri="{BB962C8B-B14F-4D97-AF65-F5344CB8AC3E}">
-        <p14:creationId xmlns:p14="http://schemas.microsoft.com/office/powerpoint/2010/main" val="4119545744"/>
       </p:ext>
     </p:extLst>
   </p:cSld>

</xml_diff>

<commit_message>
Updated activation_functions.pptx to new color palette.
</commit_message>
<xml_diff>
--- a/presentations/02.2_activation_functions.pptx
+++ b/presentations/02.2_activation_functions.pptx
@@ -222,7 +222,7 @@
           <a:p>
             <a:fld id="{FD93C9B2-20F6-4DB1-B471-224337D0AC79}" type="datetimeFigureOut">
               <a:rPr lang="en-US" smtClean="0"/>
-              <a:t>11/7/2022</a:t>
+              <a:t>11/14/2022</a:t>
             </a:fld>
             <a:endParaRPr lang="en-US"/>
           </a:p>
@@ -2726,7 +2726,7 @@
           <a:p>
             <a:fld id="{C3F78080-8D0A-4BE8-A5B4-CB115102D524}" type="datetimeFigureOut">
               <a:rPr lang="en-US" smtClean="0"/>
-              <a:t>11/7/2022</a:t>
+              <a:t>11/14/2022</a:t>
             </a:fld>
             <a:endParaRPr lang="en-US"/>
           </a:p>
@@ -2924,7 +2924,7 @@
           <a:p>
             <a:fld id="{C3F78080-8D0A-4BE8-A5B4-CB115102D524}" type="datetimeFigureOut">
               <a:rPr lang="en-US" smtClean="0"/>
-              <a:t>11/7/2022</a:t>
+              <a:t>11/14/2022</a:t>
             </a:fld>
             <a:endParaRPr lang="en-US"/>
           </a:p>
@@ -3132,7 +3132,7 @@
           <a:p>
             <a:fld id="{C3F78080-8D0A-4BE8-A5B4-CB115102D524}" type="datetimeFigureOut">
               <a:rPr lang="en-US" smtClean="0"/>
-              <a:t>11/7/2022</a:t>
+              <a:t>11/14/2022</a:t>
             </a:fld>
             <a:endParaRPr lang="en-US"/>
           </a:p>
@@ -3330,7 +3330,7 @@
           <a:p>
             <a:fld id="{C3F78080-8D0A-4BE8-A5B4-CB115102D524}" type="datetimeFigureOut">
               <a:rPr lang="en-US" smtClean="0"/>
-              <a:t>11/7/2022</a:t>
+              <a:t>11/14/2022</a:t>
             </a:fld>
             <a:endParaRPr lang="en-US"/>
           </a:p>
@@ -3605,7 +3605,7 @@
           <a:p>
             <a:fld id="{C3F78080-8D0A-4BE8-A5B4-CB115102D524}" type="datetimeFigureOut">
               <a:rPr lang="en-US" smtClean="0"/>
-              <a:t>11/7/2022</a:t>
+              <a:t>11/14/2022</a:t>
             </a:fld>
             <a:endParaRPr lang="en-US"/>
           </a:p>
@@ -3870,7 +3870,7 @@
           <a:p>
             <a:fld id="{C3F78080-8D0A-4BE8-A5B4-CB115102D524}" type="datetimeFigureOut">
               <a:rPr lang="en-US" smtClean="0"/>
-              <a:t>11/7/2022</a:t>
+              <a:t>11/14/2022</a:t>
             </a:fld>
             <a:endParaRPr lang="en-US"/>
           </a:p>
@@ -4282,7 +4282,7 @@
           <a:p>
             <a:fld id="{C3F78080-8D0A-4BE8-A5B4-CB115102D524}" type="datetimeFigureOut">
               <a:rPr lang="en-US" smtClean="0"/>
-              <a:t>11/7/2022</a:t>
+              <a:t>11/14/2022</a:t>
             </a:fld>
             <a:endParaRPr lang="en-US"/>
           </a:p>
@@ -4423,7 +4423,7 @@
           <a:p>
             <a:fld id="{C3F78080-8D0A-4BE8-A5B4-CB115102D524}" type="datetimeFigureOut">
               <a:rPr lang="en-US" smtClean="0"/>
-              <a:t>11/7/2022</a:t>
+              <a:t>11/14/2022</a:t>
             </a:fld>
             <a:endParaRPr lang="en-US"/>
           </a:p>
@@ -4536,7 +4536,7 @@
           <a:p>
             <a:fld id="{C3F78080-8D0A-4BE8-A5B4-CB115102D524}" type="datetimeFigureOut">
               <a:rPr lang="en-US" smtClean="0"/>
-              <a:t>11/7/2022</a:t>
+              <a:t>11/14/2022</a:t>
             </a:fld>
             <a:endParaRPr lang="en-US"/>
           </a:p>
@@ -4847,7 +4847,7 @@
           <a:p>
             <a:fld id="{C3F78080-8D0A-4BE8-A5B4-CB115102D524}" type="datetimeFigureOut">
               <a:rPr lang="en-US" smtClean="0"/>
-              <a:t>11/7/2022</a:t>
+              <a:t>11/14/2022</a:t>
             </a:fld>
             <a:endParaRPr lang="en-US"/>
           </a:p>
@@ -5135,7 +5135,7 @@
           <a:p>
             <a:fld id="{C3F78080-8D0A-4BE8-A5B4-CB115102D524}" type="datetimeFigureOut">
               <a:rPr lang="en-US" smtClean="0"/>
-              <a:t>11/7/2022</a:t>
+              <a:t>11/14/2022</a:t>
             </a:fld>
             <a:endParaRPr lang="en-US"/>
           </a:p>
@@ -5376,7 +5376,7 @@
           <a:p>
             <a:fld id="{C3F78080-8D0A-4BE8-A5B4-CB115102D524}" type="datetimeFigureOut">
               <a:rPr lang="en-US" smtClean="0"/>
-              <a:t>11/7/2022</a:t>
+              <a:t>11/14/2022</a:t>
             </a:fld>
             <a:endParaRPr lang="en-US"/>
           </a:p>
@@ -5893,7 +5893,7 @@
         </p:blipFill>
         <p:spPr>
           <a:xfrm>
-            <a:off x="11362821" y="6028821"/>
+            <a:off x="11189401" y="5902393"/>
             <a:ext cx="829179" cy="829179"/>
           </a:xfrm>
           <a:prstGeom prst="rect">
@@ -5957,7 +5957,7 @@
         </p:nvSpPr>
         <p:spPr>
           <a:xfrm>
-            <a:off x="1634833" y="2243985"/>
+            <a:off x="1620970" y="1919026"/>
             <a:ext cx="10557165" cy="523220"/>
           </a:xfrm>
           <a:prstGeom prst="rect">
@@ -6010,7 +6010,7 @@
         </p:nvSpPr>
         <p:spPr>
           <a:xfrm>
-            <a:off x="1634834" y="3135078"/>
+            <a:off x="1620971" y="2810119"/>
             <a:ext cx="10557165" cy="523220"/>
           </a:xfrm>
           <a:prstGeom prst="rect">
@@ -6128,7 +6128,7 @@
         </p:nvSpPr>
         <p:spPr>
           <a:xfrm>
-            <a:off x="1634835" y="4026171"/>
+            <a:off x="1620972" y="3701212"/>
             <a:ext cx="10557161" cy="523220"/>
           </a:xfrm>
           <a:prstGeom prst="rect">
@@ -6217,7 +6217,7 @@
         </p:nvSpPr>
         <p:spPr>
           <a:xfrm>
-            <a:off x="1634839" y="4917264"/>
+            <a:off x="1620976" y="4592305"/>
             <a:ext cx="10557161" cy="523220"/>
           </a:xfrm>
           <a:prstGeom prst="rect">
@@ -6712,7 +6712,7 @@
             <a:avLst/>
           </a:prstGeom>
           <a:solidFill>
-            <a:srgbClr val="6D6CCA"/>
+            <a:srgbClr val="5A5AA8"/>
           </a:solidFill>
           <a:ln w="44450">
             <a:noFill/>
@@ -6951,10 +6951,12 @@
               <a:avLst/>
             </a:prstGeom>
             <a:solidFill>
-              <a:srgbClr val="6D6CCA"/>
+              <a:srgbClr val="5A5AA8"/>
             </a:solidFill>
-            <a:ln w="44450">
-              <a:noFill/>
+            <a:ln w="3175">
+              <a:solidFill>
+                <a:schemeClr val="tx1"/>
+              </a:solidFill>
             </a:ln>
             <a:effectLst/>
           </p:spPr>
@@ -7372,8 +7374,10 @@
           <a:solidFill>
             <a:srgbClr val="65BB7B"/>
           </a:solidFill>
-          <a:ln w="44450">
-            <a:noFill/>
+          <a:ln w="3175">
+            <a:solidFill>
+              <a:schemeClr val="tx1"/>
+            </a:solidFill>
           </a:ln>
           <a:effectLst/>
         </p:spPr>
@@ -7861,10 +7865,12 @@
               <a:avLst/>
             </a:prstGeom>
             <a:solidFill>
-              <a:srgbClr val="6D6CCA"/>
+              <a:srgbClr val="5A5AA8"/>
             </a:solidFill>
-            <a:ln w="44450">
-              <a:noFill/>
+            <a:ln w="3175">
+              <a:solidFill>
+                <a:schemeClr val="tx1"/>
+              </a:solidFill>
             </a:ln>
             <a:effectLst/>
           </p:spPr>
@@ -8279,10 +8285,12 @@
             <a:avLst/>
           </a:prstGeom>
           <a:solidFill>
-            <a:srgbClr val="6D6CCA"/>
+            <a:srgbClr val="D3D3F1"/>
           </a:solidFill>
-          <a:ln>
-            <a:noFill/>
+          <a:ln w="28575">
+            <a:solidFill>
+              <a:schemeClr val="tx1"/>
+            </a:solidFill>
           </a:ln>
         </p:spPr>
         <p:style>
@@ -8308,6 +8316,9 @@
             <a:pPr algn="ctr"/>
             <a:r>
               <a:rPr lang="en-US" sz="8000" dirty="0">
+                <a:solidFill>
+                  <a:schemeClr val="tx1"/>
+                </a:solidFill>
                 <a:latin typeface="Avenir Light" panose="020B0402020203020204" pitchFamily="34" charset="77"/>
               </a:rPr>
               <a:t>+</a:t>
@@ -8338,10 +8349,12 @@
             </a:avLst>
           </a:prstGeom>
           <a:solidFill>
-            <a:srgbClr val="62BD7D"/>
+            <a:srgbClr val="D6EECF"/>
           </a:solidFill>
-          <a:ln>
-            <a:noFill/>
+          <a:ln w="28575">
+            <a:solidFill>
+              <a:schemeClr val="tx1"/>
+            </a:solidFill>
           </a:ln>
         </p:spPr>
         <p:style>
@@ -8395,7 +8408,7 @@
           </a:prstGeom>
           <a:ln w="38100">
             <a:solidFill>
-              <a:schemeClr val="bg1"/>
+              <a:schemeClr val="tx1"/>
             </a:solidFill>
           </a:ln>
         </p:spPr>
@@ -8880,7 +8893,7 @@
             <a:r>
               <a:rPr lang="en-US" sz="1600" dirty="0">
                 <a:solidFill>
-                  <a:srgbClr val="62BD7D"/>
+                  <a:srgbClr val="3D3880"/>
                 </a:solidFill>
                 <a:latin typeface="Avenir Medium" panose="02000503020000020003" pitchFamily="2" charset="0"/>
               </a:rPr>
@@ -8925,7 +8938,7 @@
             <a:r>
               <a:rPr lang="en-US" sz="1600" dirty="0">
                 <a:solidFill>
-                  <a:srgbClr val="62BD7D"/>
+                  <a:srgbClr val="3D3880"/>
                 </a:solidFill>
                 <a:latin typeface="Avenir Medium" panose="02000503020000020003" pitchFamily="2" charset="0"/>
               </a:rPr>
@@ -8948,8 +8961,8 @@
         </p:nvSpPr>
         <p:spPr>
           <a:xfrm>
-            <a:off x="4262852" y="3215244"/>
-            <a:ext cx="1152935" cy="338554"/>
+            <a:off x="4343883" y="3215244"/>
+            <a:ext cx="1071904" cy="338554"/>
           </a:xfrm>
           <a:prstGeom prst="rect">
             <a:avLst/>
@@ -8970,7 +8983,7 @@
             <a:r>
               <a:rPr lang="en-US" sz="1600" dirty="0">
                 <a:solidFill>
-                  <a:srgbClr val="62BD7D"/>
+                  <a:srgbClr val="3D3880"/>
                 </a:solidFill>
                 <a:latin typeface="Avenir Medium" panose="02000503020000020003" pitchFamily="2" charset="0"/>
               </a:rPr>
@@ -9015,7 +9028,7 @@
             <a:r>
               <a:rPr lang="en-US" sz="1600" dirty="0">
                 <a:solidFill>
-                  <a:srgbClr val="62BD7D"/>
+                  <a:srgbClr val="3D3880"/>
                 </a:solidFill>
                 <a:latin typeface="Avenir Medium" panose="02000503020000020003" pitchFamily="2" charset="0"/>
               </a:rPr>
@@ -9060,7 +9073,7 @@
             <a:r>
               <a:rPr lang="en-US" sz="1600" dirty="0">
                 <a:solidFill>
-                  <a:srgbClr val="62BD7D"/>
+                  <a:srgbClr val="3D3880"/>
                 </a:solidFill>
                 <a:latin typeface="Avenir Medium" panose="02000503020000020003" pitchFamily="2" charset="0"/>
               </a:rPr>
@@ -12592,10 +12605,12 @@
             <a:avLst/>
           </a:prstGeom>
           <a:solidFill>
-            <a:srgbClr val="6D6CCA"/>
+            <a:srgbClr val="D3D3F1"/>
           </a:solidFill>
-          <a:ln>
-            <a:noFill/>
+          <a:ln w="19050">
+            <a:solidFill>
+              <a:schemeClr val="tx1"/>
+            </a:solidFill>
           </a:ln>
         </p:spPr>
         <p:style>
@@ -12654,9 +12669,6 @@
             <a:pPr algn="ctr"/>
             <a:r>
               <a:rPr lang="en-US" sz="2000" dirty="0">
-                <a:solidFill>
-                  <a:schemeClr val="bg1"/>
-                </a:solidFill>
                 <a:latin typeface="Avenir Medium" panose="02000503020000020003" pitchFamily="2" charset="0"/>
                 <a:cs typeface="Futura Medium" panose="020B0602020204020303" pitchFamily="34" charset="-79"/>
               </a:rPr>
@@ -13331,10 +13343,12 @@
             </a:avLst>
           </a:prstGeom>
           <a:solidFill>
-            <a:srgbClr val="65BB7B"/>
+            <a:srgbClr val="D6EECF"/>
           </a:solidFill>
-          <a:ln>
-            <a:noFill/>
+          <a:ln w="19050">
+            <a:solidFill>
+              <a:schemeClr val="tx1"/>
+            </a:solidFill>
           </a:ln>
         </p:spPr>
         <p:style>
@@ -13385,10 +13399,12 @@
             </a:avLst>
           </a:prstGeom>
           <a:solidFill>
-            <a:srgbClr val="65BB7B"/>
+            <a:srgbClr val="D6EECF"/>
           </a:solidFill>
-          <a:ln>
-            <a:noFill/>
+          <a:ln w="19050">
+            <a:solidFill>
+              <a:schemeClr val="tx1"/>
+            </a:solidFill>
           </a:ln>
         </p:spPr>
         <p:style>
@@ -13439,10 +13455,12 @@
             </a:avLst>
           </a:prstGeom>
           <a:solidFill>
-            <a:srgbClr val="65BB7B"/>
+            <a:srgbClr val="D6EECF"/>
           </a:solidFill>
-          <a:ln>
-            <a:noFill/>
+          <a:ln w="19050">
+            <a:solidFill>
+              <a:schemeClr val="tx1"/>
+            </a:solidFill>
           </a:ln>
         </p:spPr>
         <p:style>

</xml_diff>

<commit_message>
Workshop presentation updates (11.22.22).
</commit_message>
<xml_diff>
--- a/presentations/02.2_activation_functions.pptx
+++ b/presentations/02.2_activation_functions.pptx
@@ -5,7 +5,7 @@
     <p:sldMasterId id="2147483648" r:id="rId1"/>
   </p:sldMasterIdLst>
   <p:notesMasterIdLst>
-    <p:notesMasterId r:id="rId17"/>
+    <p:notesMasterId r:id="rId15"/>
   </p:notesMasterIdLst>
   <p:sldIdLst>
     <p:sldId id="322" r:id="rId2"/>
@@ -21,8 +21,6 @@
     <p:sldId id="323" r:id="rId12"/>
     <p:sldId id="329" r:id="rId13"/>
     <p:sldId id="305" r:id="rId14"/>
-    <p:sldId id="328" r:id="rId15"/>
-    <p:sldId id="309" r:id="rId16"/>
   </p:sldIdLst>
   <p:sldSz cx="12192000" cy="6858000"/>
   <p:notesSz cx="6858000" cy="9144000"/>
@@ -690,7 +688,7 @@
             </a:pPr>
             <a:r>
               <a:rPr lang="en-US" dirty="0"/>
-              <a:t>In recent years, Keras has released a variety of advanced activation functions.  Leaky ReLU, parametric ReLU, and exponential linear unit are all derived from the basic ReLU function.  Refer to the Keras documentation for more information about these options.</a:t>
+              <a:t>In recent years, Keras has released a variety of advanced activation functions.  Leaky ReLU, parametric ReLU, and exponential linear unit are all derived from the basic ReLU function.  For more information about these options, see the Keras documentation.</a:t>
             </a:r>
           </a:p>
         </p:txBody>
@@ -1332,250 +1330,6 @@
 </p:notes>
 </file>
 
-<file path=ppt/notesSlides/notesSlide14.xml><?xml version="1.0" encoding="utf-8"?>
-<p:notes xmlns:a="http://schemas.openxmlformats.org/drawingml/2006/main" xmlns:r="http://schemas.openxmlformats.org/officeDocument/2006/relationships" xmlns:p="http://schemas.openxmlformats.org/presentationml/2006/main">
-  <p:cSld>
-    <p:spTree>
-      <p:nvGrpSpPr>
-        <p:cNvPr id="1" name=""/>
-        <p:cNvGrpSpPr/>
-        <p:nvPr/>
-      </p:nvGrpSpPr>
-      <p:grpSpPr>
-        <a:xfrm>
-          <a:off x="0" y="0"/>
-          <a:ext cx="0" cy="0"/>
-          <a:chOff x="0" y="0"/>
-          <a:chExt cx="0" cy="0"/>
-        </a:xfrm>
-      </p:grpSpPr>
-      <p:sp>
-        <p:nvSpPr>
-          <p:cNvPr id="2" name="Slide Image Placeholder 1"/>
-          <p:cNvSpPr>
-            <a:spLocks noGrp="1" noRot="1" noChangeAspect="1"/>
-          </p:cNvSpPr>
-          <p:nvPr>
-            <p:ph type="sldImg"/>
-          </p:nvPr>
-        </p:nvSpPr>
-        <p:spPr/>
-      </p:sp>
-      <p:sp>
-        <p:nvSpPr>
-          <p:cNvPr id="3" name="Notes Placeholder 2"/>
-          <p:cNvSpPr>
-            <a:spLocks noGrp="1"/>
-          </p:cNvSpPr>
-          <p:nvPr>
-            <p:ph type="body" idx="1"/>
-          </p:nvPr>
-        </p:nvSpPr>
-        <p:spPr/>
-        <p:txBody>
-          <a:bodyPr/>
-          <a:lstStyle/>
-          <a:p>
-            <a:pPr marL="0" marR="0" lvl="0" indent="0" algn="l" defTabSz="914400" rtl="0" eaLnBrk="1" fontAlgn="auto" latinLnBrk="0" hangingPunct="1">
-              <a:lnSpc>
-                <a:spcPct val="100000"/>
-              </a:lnSpc>
-              <a:spcBef>
-                <a:spcPts val="0"/>
-              </a:spcBef>
-              <a:spcAft>
-                <a:spcPts val="0"/>
-              </a:spcAft>
-              <a:buClrTx/>
-              <a:buSzTx/>
-              <a:buFontTx/>
-              <a:buNone/>
-              <a:tabLst/>
-              <a:defRPr/>
-            </a:pPr>
-            <a:endParaRPr lang="en-US" sz="1200" dirty="0">
-              <a:solidFill>
-                <a:schemeClr val="tx1">
-                  <a:lumMod val="65000"/>
-                  <a:lumOff val="35000"/>
-                </a:schemeClr>
-              </a:solidFill>
-              <a:latin typeface="Palatino Linotype" panose="02040502050505030304" pitchFamily="18" charset="0"/>
-            </a:endParaRPr>
-          </a:p>
-          <a:p>
-            <a:pPr marL="0" marR="0" lvl="0" indent="0" algn="l" defTabSz="914400" rtl="0" eaLnBrk="1" fontAlgn="auto" latinLnBrk="0" hangingPunct="1">
-              <a:lnSpc>
-                <a:spcPct val="100000"/>
-              </a:lnSpc>
-              <a:spcBef>
-                <a:spcPts val="0"/>
-              </a:spcBef>
-              <a:spcAft>
-                <a:spcPts val="0"/>
-              </a:spcAft>
-              <a:buClrTx/>
-              <a:buSzTx/>
-              <a:buFontTx/>
-              <a:buNone/>
-              <a:tabLst/>
-              <a:defRPr/>
-            </a:pPr>
-            <a:endParaRPr lang="en-US" sz="1200" dirty="0">
-              <a:solidFill>
-                <a:schemeClr val="tx1">
-                  <a:lumMod val="65000"/>
-                  <a:lumOff val="35000"/>
-                </a:schemeClr>
-              </a:solidFill>
-              <a:latin typeface="Palatino Linotype" panose="02040502050505030304" pitchFamily="18" charset="0"/>
-            </a:endParaRPr>
-          </a:p>
-        </p:txBody>
-      </p:sp>
-      <p:sp>
-        <p:nvSpPr>
-          <p:cNvPr id="4" name="Slide Number Placeholder 3"/>
-          <p:cNvSpPr>
-            <a:spLocks noGrp="1"/>
-          </p:cNvSpPr>
-          <p:nvPr>
-            <p:ph type="sldNum" sz="quarter" idx="5"/>
-          </p:nvPr>
-        </p:nvSpPr>
-        <p:spPr/>
-        <p:txBody>
-          <a:bodyPr/>
-          <a:lstStyle/>
-          <a:p>
-            <a:fld id="{3148858F-F1DB-4027-9C85-CCA6849540DD}" type="slidenum">
-              <a:rPr lang="en-US" smtClean="0"/>
-              <a:t>14</a:t>
-            </a:fld>
-            <a:endParaRPr lang="en-US"/>
-          </a:p>
-        </p:txBody>
-      </p:sp>
-    </p:spTree>
-    <p:extLst>
-      <p:ext uri="{BB962C8B-B14F-4D97-AF65-F5344CB8AC3E}">
-        <p14:creationId xmlns:p14="http://schemas.microsoft.com/office/powerpoint/2010/main" val="3984198268"/>
-      </p:ext>
-    </p:extLst>
-  </p:cSld>
-  <p:clrMapOvr>
-    <a:masterClrMapping/>
-  </p:clrMapOvr>
-</p:notes>
-</file>
-
-<file path=ppt/notesSlides/notesSlide15.xml><?xml version="1.0" encoding="utf-8"?>
-<p:notes xmlns:a="http://schemas.openxmlformats.org/drawingml/2006/main" xmlns:r="http://schemas.openxmlformats.org/officeDocument/2006/relationships" xmlns:p="http://schemas.openxmlformats.org/presentationml/2006/main">
-  <p:cSld>
-    <p:spTree>
-      <p:nvGrpSpPr>
-        <p:cNvPr id="1" name=""/>
-        <p:cNvGrpSpPr/>
-        <p:nvPr/>
-      </p:nvGrpSpPr>
-      <p:grpSpPr>
-        <a:xfrm>
-          <a:off x="0" y="0"/>
-          <a:ext cx="0" cy="0"/>
-          <a:chOff x="0" y="0"/>
-          <a:chExt cx="0" cy="0"/>
-        </a:xfrm>
-      </p:grpSpPr>
-      <p:sp>
-        <p:nvSpPr>
-          <p:cNvPr id="2" name="Slide Image Placeholder 1"/>
-          <p:cNvSpPr>
-            <a:spLocks noGrp="1" noRot="1" noChangeAspect="1"/>
-          </p:cNvSpPr>
-          <p:nvPr>
-            <p:ph type="sldImg"/>
-          </p:nvPr>
-        </p:nvSpPr>
-        <p:spPr/>
-      </p:sp>
-      <p:sp>
-        <p:nvSpPr>
-          <p:cNvPr id="3" name="Notes Placeholder 2"/>
-          <p:cNvSpPr>
-            <a:spLocks noGrp="1"/>
-          </p:cNvSpPr>
-          <p:nvPr>
-            <p:ph type="body" idx="1"/>
-          </p:nvPr>
-        </p:nvSpPr>
-        <p:spPr/>
-        <p:txBody>
-          <a:bodyPr/>
-          <a:lstStyle/>
-          <a:p>
-            <a:pPr marL="0" marR="0" lvl="0" indent="0" algn="l" defTabSz="914400" rtl="0" eaLnBrk="1" fontAlgn="auto" latinLnBrk="0" hangingPunct="1">
-              <a:lnSpc>
-                <a:spcPct val="100000"/>
-              </a:lnSpc>
-              <a:spcBef>
-                <a:spcPts val="0"/>
-              </a:spcBef>
-              <a:spcAft>
-                <a:spcPts val="0"/>
-              </a:spcAft>
-              <a:buClrTx/>
-              <a:buSzTx/>
-              <a:buFontTx/>
-              <a:buNone/>
-              <a:tabLst/>
-              <a:defRPr/>
-            </a:pPr>
-            <a:r>
-              <a:rPr lang="en-US" dirty="0"/>
-              <a:t>The learning experience for this workshop starts on page 55 of the textbook.  For additional information, please watch the exercise 2.01 orientation video.</a:t>
-            </a:r>
-          </a:p>
-          <a:p>
-            <a:endParaRPr lang="en-US" dirty="0"/>
-          </a:p>
-        </p:txBody>
-      </p:sp>
-      <p:sp>
-        <p:nvSpPr>
-          <p:cNvPr id="4" name="Slide Number Placeholder 3"/>
-          <p:cNvSpPr>
-            <a:spLocks noGrp="1"/>
-          </p:cNvSpPr>
-          <p:nvPr>
-            <p:ph type="sldNum" sz="quarter" idx="5"/>
-          </p:nvPr>
-        </p:nvSpPr>
-        <p:spPr/>
-        <p:txBody>
-          <a:bodyPr/>
-          <a:lstStyle/>
-          <a:p>
-            <a:fld id="{3148858F-F1DB-4027-9C85-CCA6849540DD}" type="slidenum">
-              <a:rPr lang="en-US" smtClean="0"/>
-              <a:t>15</a:t>
-            </a:fld>
-            <a:endParaRPr lang="en-US"/>
-          </a:p>
-        </p:txBody>
-      </p:sp>
-    </p:spTree>
-    <p:extLst>
-      <p:ext uri="{BB962C8B-B14F-4D97-AF65-F5344CB8AC3E}">
-        <p14:creationId xmlns:p14="http://schemas.microsoft.com/office/powerpoint/2010/main" val="1401395996"/>
-      </p:ext>
-    </p:extLst>
-  </p:cSld>
-  <p:clrMapOvr>
-    <a:masterClrMapping/>
-  </p:clrMapOvr>
-</p:notes>
-</file>
-
 <file path=ppt/notesSlides/notesSlide2.xml><?xml version="1.0" encoding="utf-8"?>
 <p:notes xmlns:a="http://schemas.openxmlformats.org/drawingml/2006/main" xmlns:r="http://schemas.openxmlformats.org/officeDocument/2006/relationships" xmlns:p="http://schemas.openxmlformats.org/presentationml/2006/main">
   <p:cSld>
@@ -1849,7 +1603,7 @@
           <a:p>
             <a:r>
               <a:rPr lang="en-US" dirty="0"/>
-              <a:t>Rosenblatt’s original perceptron was a simple animal.  When z was less than or equal to zero, the perceptron output 0.  If z became positive, the perceptron outputs a 1.  But this sudden and extreme transition is not optimal during training.  Essentially, the neuron has no finesse – it’s either yelling or its silent. </a:t>
+              <a:t>Rosenblatt’s original perceptron was a simple animal.  When z is less than or equal to zero, the perceptron outputs 0.  If z became positive, the perceptron outputs a 1.  But this sudden and extreme transition is not optimal during training.  Essentially, the neuron has no finesse – it’s either yelling or its silent. </a:t>
             </a:r>
           </a:p>
           <a:p>
@@ -1944,34 +1698,24 @@
           <a:lstStyle/>
           <a:p>
             <a:r>
-              <a:rPr lang="en-US" b="0" i="0" dirty="0">
+              <a:rPr lang="en-US" b="1" i="0" dirty="0">
                 <a:solidFill>
                   <a:srgbClr val="3D3B49"/>
                 </a:solidFill>
                 <a:effectLst/>
                 <a:latin typeface="+mn-lt"/>
               </a:rPr>
-              <a:t>Activation functions comprised of one or more straight lines are called </a:t>
-            </a:r>
-            <a:r>
-              <a:rPr lang="en-US" b="1" i="0" dirty="0">
+              <a:t>Linear</a:t>
+            </a:r>
+            <a:r>
+              <a:rPr lang="en-US" b="0" i="0" dirty="0">
                 <a:solidFill>
                   <a:srgbClr val="3D3B49"/>
                 </a:solidFill>
                 <a:effectLst/>
                 <a:latin typeface="+mn-lt"/>
               </a:rPr>
-              <a:t>linear</a:t>
-            </a:r>
-            <a:r>
-              <a:rPr lang="en-US" b="0" i="0" dirty="0">
-                <a:solidFill>
-                  <a:srgbClr val="3D3B49"/>
-                </a:solidFill>
-                <a:effectLst/>
-                <a:latin typeface="+mn-lt"/>
-              </a:rPr>
-              <a:t> functions.  Unlike the simple perceptron, these functions have a learning gradient.</a:t>
+              <a:t> functions consist of one or more straight lines.  Unlike the simple perceptron, these functions have a learning gradient.</a:t>
             </a:r>
           </a:p>
           <a:p>
@@ -2005,7 +1749,7 @@
                 <a:effectLst/>
                 <a:latin typeface="Verdana" panose="020B0604030504040204" pitchFamily="34" charset="0"/>
               </a:rPr>
-              <a:t>function is a named block of code that runs when it is called.  Most functions allow you to pass data – called parameters – into them.  Most functions also return a value once they’ve been executed.  Here we see a simple function called f, with one parameter called x.  When we pass a value on the x-axis to this function, it returns a value that is then assigned to a variable named y.</a:t>
+              <a:t>function is a named block of code that runs when it is called.  Most functions allow you to pass data – called parameters – into them.  Most functions also return a value once they’ve been executed.  Here we see a simple function called f, with one parameter called x.  When we pass an input value on the x-axis to this function, it returns a y output value.</a:t>
             </a:r>
           </a:p>
           <a:p>
@@ -7460,500 +7204,6 @@
     <p:extLst>
       <p:ext uri="{BB962C8B-B14F-4D97-AF65-F5344CB8AC3E}">
         <p14:creationId xmlns:p14="http://schemas.microsoft.com/office/powerpoint/2010/main" val="994788979"/>
-      </p:ext>
-    </p:extLst>
-  </p:cSld>
-  <p:clrMapOvr>
-    <a:masterClrMapping/>
-  </p:clrMapOvr>
-  <mc:AlternateContent xmlns:mc="http://schemas.openxmlformats.org/markup-compatibility/2006" xmlns:p14="http://schemas.microsoft.com/office/powerpoint/2010/main">
-    <mc:Choice Requires="p14">
-      <p:transition spd="med" p14:dur="700">
-        <p:fade/>
-      </p:transition>
-    </mc:Choice>
-    <mc:Fallback xmlns="">
-      <p:transition spd="med">
-        <p:fade/>
-      </p:transition>
-    </mc:Fallback>
-  </mc:AlternateContent>
-</p:sld>
-</file>
-
-<file path=ppt/slides/slide14.xml><?xml version="1.0" encoding="utf-8"?>
-<p:sld xmlns:a="http://schemas.openxmlformats.org/drawingml/2006/main" xmlns:r="http://schemas.openxmlformats.org/officeDocument/2006/relationships" xmlns:p="http://schemas.openxmlformats.org/presentationml/2006/main">
-  <p:cSld>
-    <p:spTree>
-      <p:nvGrpSpPr>
-        <p:cNvPr id="1" name=""/>
-        <p:cNvGrpSpPr/>
-        <p:nvPr/>
-      </p:nvGrpSpPr>
-      <p:grpSpPr>
-        <a:xfrm>
-          <a:off x="0" y="0"/>
-          <a:ext cx="0" cy="0"/>
-          <a:chOff x="0" y="0"/>
-          <a:chExt cx="0" cy="0"/>
-        </a:xfrm>
-      </p:grpSpPr>
-    </p:spTree>
-    <p:extLst>
-      <p:ext uri="{BB962C8B-B14F-4D97-AF65-F5344CB8AC3E}">
-        <p14:creationId xmlns:p14="http://schemas.microsoft.com/office/powerpoint/2010/main" val="3567181481"/>
-      </p:ext>
-    </p:extLst>
-  </p:cSld>
-  <p:clrMapOvr>
-    <a:masterClrMapping/>
-  </p:clrMapOvr>
-  <mc:AlternateContent xmlns:mc="http://schemas.openxmlformats.org/markup-compatibility/2006" xmlns:p14="http://schemas.microsoft.com/office/powerpoint/2010/main">
-    <mc:Choice Requires="p14">
-      <p:transition spd="med" p14:dur="700">
-        <p:fade/>
-      </p:transition>
-    </mc:Choice>
-    <mc:Fallback xmlns="">
-      <p:transition spd="med">
-        <p:fade/>
-      </p:transition>
-    </mc:Fallback>
-  </mc:AlternateContent>
-</p:sld>
-</file>
-
-<file path=ppt/slides/slide15.xml><?xml version="1.0" encoding="utf-8"?>
-<p:sld xmlns:a="http://schemas.openxmlformats.org/drawingml/2006/main" xmlns:r="http://schemas.openxmlformats.org/officeDocument/2006/relationships" xmlns:p="http://schemas.openxmlformats.org/presentationml/2006/main">
-  <p:cSld>
-    <p:spTree>
-      <p:nvGrpSpPr>
-        <p:cNvPr id="1" name=""/>
-        <p:cNvGrpSpPr/>
-        <p:nvPr/>
-      </p:nvGrpSpPr>
-      <p:grpSpPr>
-        <a:xfrm>
-          <a:off x="0" y="0"/>
-          <a:ext cx="0" cy="0"/>
-          <a:chOff x="0" y="0"/>
-          <a:chExt cx="0" cy="0"/>
-        </a:xfrm>
-      </p:grpSpPr>
-      <p:sp>
-        <p:nvSpPr>
-          <p:cNvPr id="3" name="Text Placeholder 2">
-            <a:extLst>
-              <a:ext uri="{FF2B5EF4-FFF2-40B4-BE49-F238E27FC236}">
-                <a16:creationId xmlns:a16="http://schemas.microsoft.com/office/drawing/2014/main" id="{098BC2D2-CCF7-4C63-8489-B46BF394FCA2}"/>
-              </a:ext>
-            </a:extLst>
-          </p:cNvPr>
-          <p:cNvSpPr>
-            <a:spLocks noGrp="1"/>
-          </p:cNvSpPr>
-          <p:nvPr>
-            <p:ph type="body" idx="1"/>
-          </p:nvPr>
-        </p:nvSpPr>
-        <p:spPr>
-          <a:xfrm>
-            <a:off x="0" y="4285400"/>
-            <a:ext cx="12192000" cy="518830"/>
-          </a:xfrm>
-        </p:spPr>
-        <p:txBody>
-          <a:bodyPr>
-            <a:normAutofit/>
-          </a:bodyPr>
-          <a:lstStyle/>
-          <a:p>
-            <a:endParaRPr lang="en-US" dirty="0">
-              <a:latin typeface="Palatino Linotype" panose="02040502050505030304" pitchFamily="18" charset="0"/>
-              <a:cs typeface="Segoe UI" panose="020B0502040204020203" pitchFamily="34" charset="0"/>
-            </a:endParaRPr>
-          </a:p>
-          <a:p>
-            <a:endParaRPr lang="en-US" dirty="0">
-              <a:latin typeface="Palatino Linotype" panose="02040502050505030304" pitchFamily="18" charset="0"/>
-              <a:cs typeface="Segoe UI" panose="020B0502040204020203" pitchFamily="34" charset="0"/>
-            </a:endParaRPr>
-          </a:p>
-          <a:p>
-            <a:endParaRPr lang="en-US" dirty="0">
-              <a:latin typeface="Palatino Linotype" panose="02040502050505030304" pitchFamily="18" charset="0"/>
-              <a:cs typeface="Segoe UI" panose="020B0502040204020203" pitchFamily="34" charset="0"/>
-            </a:endParaRPr>
-          </a:p>
-          <a:p>
-            <a:endParaRPr lang="en-US" dirty="0">
-              <a:latin typeface="Palatino Linotype" panose="02040502050505030304" pitchFamily="18" charset="0"/>
-              <a:cs typeface="Segoe UI" panose="020B0502040204020203" pitchFamily="34" charset="0"/>
-            </a:endParaRPr>
-          </a:p>
-          <a:p>
-            <a:endParaRPr lang="en-US" dirty="0">
-              <a:latin typeface="Palatino Linotype" panose="02040502050505030304" pitchFamily="18" charset="0"/>
-              <a:cs typeface="Segoe UI" panose="020B0502040204020203" pitchFamily="34" charset="0"/>
-            </a:endParaRPr>
-          </a:p>
-        </p:txBody>
-      </p:sp>
-      <p:sp>
-        <p:nvSpPr>
-          <p:cNvPr id="7" name="Title 1">
-            <a:extLst>
-              <a:ext uri="{FF2B5EF4-FFF2-40B4-BE49-F238E27FC236}">
-                <a16:creationId xmlns:a16="http://schemas.microsoft.com/office/drawing/2014/main" id="{E6A37720-E754-4A7F-B066-206AB0275CF9}"/>
-              </a:ext>
-            </a:extLst>
-          </p:cNvPr>
-          <p:cNvSpPr txBox="1">
-            <a:spLocks/>
-          </p:cNvSpPr>
-          <p:nvPr/>
-        </p:nvSpPr>
-        <p:spPr>
-          <a:xfrm>
-            <a:off x="0" y="2883665"/>
-            <a:ext cx="12192000" cy="1090669"/>
-          </a:xfrm>
-          <a:prstGeom prst="rect">
-            <a:avLst/>
-          </a:prstGeom>
-          <a:noFill/>
-        </p:spPr>
-        <p:txBody>
-          <a:bodyPr vert="horz" lIns="91440" tIns="45720" rIns="91440" bIns="45720" rtlCol="0" anchor="b">
-            <a:noAutofit/>
-          </a:bodyPr>
-          <a:lstStyle>
-            <a:lvl1pPr algn="l" defTabSz="914400" rtl="0" eaLnBrk="1" latinLnBrk="0" hangingPunct="1">
-              <a:lnSpc>
-                <a:spcPct val="90000"/>
-              </a:lnSpc>
-              <a:spcBef>
-                <a:spcPct val="0"/>
-              </a:spcBef>
-              <a:buNone/>
-              <a:defRPr sz="6000" kern="1200">
-                <a:solidFill>
-                  <a:schemeClr val="tx1"/>
-                </a:solidFill>
-                <a:latin typeface="+mj-lt"/>
-                <a:ea typeface="+mj-ea"/>
-                <a:cs typeface="+mj-cs"/>
-              </a:defRPr>
-            </a:lvl1pPr>
-          </a:lstStyle>
-          <a:p>
-            <a:pPr algn="ctr"/>
-            <a:br>
-              <a:rPr lang="en-US" sz="3600" dirty="0">
-                <a:solidFill>
-                  <a:schemeClr val="tx1">
-                    <a:lumMod val="65000"/>
-                    <a:lumOff val="35000"/>
-                  </a:schemeClr>
-                </a:solidFill>
-                <a:latin typeface="Avenir" panose="02000503020000020003" pitchFamily="2" charset="0"/>
-              </a:rPr>
-            </a:br>
-            <a:br>
-              <a:rPr lang="en-US" sz="3600" dirty="0">
-                <a:solidFill>
-                  <a:schemeClr val="tx1">
-                    <a:lumMod val="65000"/>
-                    <a:lumOff val="35000"/>
-                  </a:schemeClr>
-                </a:solidFill>
-                <a:latin typeface="Avenir" panose="02000503020000020003" pitchFamily="2" charset="0"/>
-              </a:rPr>
-            </a:br>
-            <a:br>
-              <a:rPr lang="en-US" sz="3600" dirty="0">
-                <a:solidFill>
-                  <a:schemeClr val="tx1">
-                    <a:lumMod val="65000"/>
-                    <a:lumOff val="35000"/>
-                  </a:schemeClr>
-                </a:solidFill>
-                <a:latin typeface="Avenir" panose="02000503020000020003" pitchFamily="2" charset="0"/>
-              </a:rPr>
-            </a:br>
-            <a:br>
-              <a:rPr lang="en-US" sz="3600" dirty="0">
-                <a:solidFill>
-                  <a:schemeClr val="tx1">
-                    <a:lumMod val="65000"/>
-                    <a:lumOff val="35000"/>
-                  </a:schemeClr>
-                </a:solidFill>
-                <a:latin typeface="Avenir" panose="02000503020000020003" pitchFamily="2" charset="0"/>
-              </a:rPr>
-            </a:br>
-            <a:br>
-              <a:rPr lang="en-US" sz="3600" dirty="0">
-                <a:solidFill>
-                  <a:schemeClr val="tx1">
-                    <a:lumMod val="65000"/>
-                    <a:lumOff val="35000"/>
-                  </a:schemeClr>
-                </a:solidFill>
-                <a:latin typeface="Avenir" panose="02000503020000020003" pitchFamily="2" charset="0"/>
-              </a:rPr>
-            </a:br>
-            <a:br>
-              <a:rPr lang="en-US" sz="3600" dirty="0">
-                <a:solidFill>
-                  <a:schemeClr val="tx1">
-                    <a:lumMod val="65000"/>
-                    <a:lumOff val="35000"/>
-                  </a:schemeClr>
-                </a:solidFill>
-                <a:latin typeface="Avenir" panose="02000503020000020003" pitchFamily="2" charset="0"/>
-              </a:rPr>
-            </a:br>
-            <a:br>
-              <a:rPr lang="en-US" sz="3600" dirty="0">
-                <a:solidFill>
-                  <a:schemeClr val="tx1">
-                    <a:lumMod val="65000"/>
-                    <a:lumOff val="35000"/>
-                  </a:schemeClr>
-                </a:solidFill>
-                <a:latin typeface="Avenir" panose="02000503020000020003" pitchFamily="2" charset="0"/>
-              </a:rPr>
-            </a:br>
-            <a:br>
-              <a:rPr lang="en-US" sz="3600" dirty="0">
-                <a:solidFill>
-                  <a:schemeClr val="tx1">
-                    <a:lumMod val="65000"/>
-                    <a:lumOff val="35000"/>
-                  </a:schemeClr>
-                </a:solidFill>
-                <a:latin typeface="Avenir" panose="02000503020000020003" pitchFamily="2" charset="0"/>
-              </a:rPr>
-            </a:br>
-            <a:r>
-              <a:rPr lang="en-US" sz="3600" dirty="0">
-                <a:solidFill>
-                  <a:schemeClr val="tx1">
-                    <a:lumMod val="65000"/>
-                    <a:lumOff val="35000"/>
-                  </a:schemeClr>
-                </a:solidFill>
-                <a:latin typeface="Avenir" panose="02000503020000020003" pitchFamily="2" charset="0"/>
-              </a:rPr>
-              <a:t>     (Rosenblatt’s Perceptron)</a:t>
-            </a:r>
-            <a:br>
-              <a:rPr lang="en-US" sz="3600" dirty="0">
-                <a:solidFill>
-                  <a:schemeClr val="tx1">
-                    <a:lumMod val="65000"/>
-                    <a:lumOff val="35000"/>
-                  </a:schemeClr>
-                </a:solidFill>
-                <a:latin typeface="Avenir" panose="02000503020000020003" pitchFamily="2" charset="0"/>
-              </a:rPr>
-            </a:br>
-            <a:r>
-              <a:rPr lang="en-US" sz="3600" dirty="0">
-                <a:solidFill>
-                  <a:schemeClr val="tx1">
-                    <a:lumMod val="65000"/>
-                    <a:lumOff val="35000"/>
-                  </a:schemeClr>
-                </a:solidFill>
-                <a:latin typeface="Avenir" panose="02000503020000020003" pitchFamily="2" charset="0"/>
-              </a:rPr>
-              <a:t>     </a:t>
-            </a:r>
-            <a:r>
-              <a:rPr lang="en-US" sz="2800" dirty="0">
-                <a:solidFill>
-                  <a:schemeClr val="tx1">
-                    <a:lumMod val="65000"/>
-                    <a:lumOff val="35000"/>
-                  </a:schemeClr>
-                </a:solidFill>
-                <a:latin typeface="Avenir" panose="02000503020000020003" pitchFamily="2" charset="0"/>
-              </a:rPr>
-              <a:t>02.1_perceptron.ipynb</a:t>
-            </a:r>
-            <a:endParaRPr lang="en-US" sz="2800" dirty="0">
-              <a:solidFill>
-                <a:schemeClr val="tx1">
-                  <a:lumMod val="65000"/>
-                  <a:lumOff val="35000"/>
-                </a:schemeClr>
-              </a:solidFill>
-              <a:latin typeface="Avenir" panose="02000503020000020003" pitchFamily="2" charset="0"/>
-              <a:cs typeface="Segoe UI Light" panose="020B0502040204020203" pitchFamily="34" charset="0"/>
-            </a:endParaRPr>
-          </a:p>
-        </p:txBody>
-      </p:sp>
-      <p:grpSp>
-        <p:nvGrpSpPr>
-          <p:cNvPr id="2" name="Group 1">
-            <a:extLst>
-              <a:ext uri="{FF2B5EF4-FFF2-40B4-BE49-F238E27FC236}">
-                <a16:creationId xmlns:a16="http://schemas.microsoft.com/office/drawing/2014/main" id="{EC8DD91F-1301-8306-E306-8A987B5349E5}"/>
-              </a:ext>
-            </a:extLst>
-          </p:cNvPr>
-          <p:cNvGrpSpPr/>
-          <p:nvPr/>
-        </p:nvGrpSpPr>
-        <p:grpSpPr>
-          <a:xfrm>
-            <a:off x="-116541" y="559959"/>
-            <a:ext cx="3088342" cy="805143"/>
-            <a:chOff x="-116541" y="559959"/>
-            <a:chExt cx="3088342" cy="805143"/>
-          </a:xfrm>
-        </p:grpSpPr>
-        <p:sp>
-          <p:nvSpPr>
-            <p:cNvPr id="5" name="Pentagon 4">
-              <a:extLst>
-                <a:ext uri="{FF2B5EF4-FFF2-40B4-BE49-F238E27FC236}">
-                  <a16:creationId xmlns:a16="http://schemas.microsoft.com/office/drawing/2014/main" id="{2606BB2E-8CC9-E08E-90DF-7EA30367F007}"/>
-                </a:ext>
-              </a:extLst>
-            </p:cNvPr>
-            <p:cNvSpPr/>
-            <p:nvPr/>
-          </p:nvSpPr>
-          <p:spPr>
-            <a:xfrm>
-              <a:off x="-13447" y="559959"/>
-              <a:ext cx="2985248" cy="805143"/>
-            </a:xfrm>
-            <a:prstGeom prst="homePlate">
-              <a:avLst/>
-            </a:prstGeom>
-            <a:solidFill>
-              <a:srgbClr val="5A5AA8"/>
-            </a:solidFill>
-            <a:ln w="3175">
-              <a:solidFill>
-                <a:schemeClr val="tx1"/>
-              </a:solidFill>
-            </a:ln>
-            <a:effectLst/>
-          </p:spPr>
-          <p:style>
-            <a:lnRef idx="2">
-              <a:schemeClr val="accent1">
-                <a:shade val="50000"/>
-              </a:schemeClr>
-            </a:lnRef>
-            <a:fillRef idx="1">
-              <a:schemeClr val="accent1"/>
-            </a:fillRef>
-            <a:effectRef idx="0">
-              <a:schemeClr val="accent1"/>
-            </a:effectRef>
-            <a:fontRef idx="minor">
-              <a:schemeClr val="lt1"/>
-            </a:fontRef>
-          </p:style>
-          <p:txBody>
-            <a:bodyPr rtlCol="0" anchor="ctr"/>
-            <a:lstStyle/>
-            <a:p>
-              <a:pPr algn="ctr"/>
-              <a:endParaRPr lang="en-US"/>
-            </a:p>
-          </p:txBody>
-        </p:sp>
-        <p:sp>
-          <p:nvSpPr>
-            <p:cNvPr id="6" name="TextBox 5">
-              <a:extLst>
-                <a:ext uri="{FF2B5EF4-FFF2-40B4-BE49-F238E27FC236}">
-                  <a16:creationId xmlns:a16="http://schemas.microsoft.com/office/drawing/2014/main" id="{0DE8D1E3-DEAF-64C6-B25C-43D5EC71C005}"/>
-                </a:ext>
-              </a:extLst>
-            </p:cNvPr>
-            <p:cNvSpPr txBox="1"/>
-            <p:nvPr/>
-          </p:nvSpPr>
-          <p:spPr>
-            <a:xfrm>
-              <a:off x="-116541" y="714367"/>
-              <a:ext cx="3074895" cy="553998"/>
-            </a:xfrm>
-            <a:prstGeom prst="rect">
-              <a:avLst/>
-            </a:prstGeom>
-            <a:noFill/>
-          </p:spPr>
-          <p:txBody>
-            <a:bodyPr wrap="square" rtlCol="0">
-              <a:spAutoFit/>
-            </a:bodyPr>
-            <a:lstStyle/>
-            <a:p>
-              <a:pPr algn="ctr"/>
-              <a:r>
-                <a:rPr lang="en-US" sz="3000" dirty="0">
-                  <a:solidFill>
-                    <a:schemeClr val="bg1"/>
-                  </a:solidFill>
-                  <a:latin typeface="Avenir Medium" panose="02000503020000020003" pitchFamily="2" charset="0"/>
-                  <a:cs typeface="Futura Medium" panose="020B0602020204020303" pitchFamily="34" charset="-79"/>
-                </a:rPr>
-                <a:t>Exercise</a:t>
-              </a:r>
-            </a:p>
-          </p:txBody>
-        </p:sp>
-      </p:grpSp>
-      <p:pic>
-        <p:nvPicPr>
-          <p:cNvPr id="4" name="Picture 3" descr="A picture containing dark, gauge&#10;&#10;Description automatically generated">
-            <a:extLst>
-              <a:ext uri="{FF2B5EF4-FFF2-40B4-BE49-F238E27FC236}">
-                <a16:creationId xmlns:a16="http://schemas.microsoft.com/office/drawing/2014/main" id="{7DE1BA64-0CEE-D8A6-3257-F0FE5F19FA5C}"/>
-              </a:ext>
-            </a:extLst>
-          </p:cNvPr>
-          <p:cNvPicPr>
-            <a:picLocks noChangeAspect="1"/>
-          </p:cNvPicPr>
-          <p:nvPr/>
-        </p:nvPicPr>
-        <p:blipFill>
-          <a:blip r:embed="rId3">
-            <a:extLst>
-              <a:ext uri="{28A0092B-C50C-407E-A947-70E740481C1C}">
-                <a14:useLocalDpi xmlns:a14="http://schemas.microsoft.com/office/drawing/2010/main" val="0"/>
-              </a:ext>
-            </a:extLst>
-          </a:blip>
-          <a:stretch>
-            <a:fillRect/>
-          </a:stretch>
-        </p:blipFill>
-        <p:spPr>
-          <a:xfrm>
-            <a:off x="11378037" y="6031948"/>
-            <a:ext cx="800100" cy="812800"/>
-          </a:xfrm>
-          <a:prstGeom prst="rect">
-            <a:avLst/>
-          </a:prstGeom>
-        </p:spPr>
-      </p:pic>
-    </p:spTree>
-    <p:extLst>
-      <p:ext uri="{BB962C8B-B14F-4D97-AF65-F5344CB8AC3E}">
-        <p14:creationId xmlns:p14="http://schemas.microsoft.com/office/powerpoint/2010/main" val="4096204018"/>
       </p:ext>
     </p:extLst>
   </p:cSld>

</xml_diff>